<commit_message>
aula 02 microcontroladores atu 15032023
</commit_message>
<xml_diff>
--- a/01 Classes/Aula 02 - Programação Microcontroladores.pptx
+++ b/01 Classes/Aula 02 - Programação Microcontroladores.pptx
@@ -5,7 +5,7 @@
     <p:sldMasterId id="2147483648" r:id="rId1"/>
   </p:sldMasterIdLst>
   <p:notesMasterIdLst>
-    <p:notesMasterId r:id="rId36"/>
+    <p:notesMasterId r:id="rId41"/>
   </p:notesMasterIdLst>
   <p:sldIdLst>
     <p:sldId id="256" r:id="rId2"/>
@@ -36,12 +36,17 @@
     <p:sldId id="340" r:id="rId27"/>
     <p:sldId id="364" r:id="rId28"/>
     <p:sldId id="363" r:id="rId29"/>
-    <p:sldId id="341" r:id="rId30"/>
-    <p:sldId id="333" r:id="rId31"/>
-    <p:sldId id="323" r:id="rId32"/>
-    <p:sldId id="334" r:id="rId33"/>
-    <p:sldId id="337" r:id="rId34"/>
-    <p:sldId id="309" r:id="rId35"/>
+    <p:sldId id="369" r:id="rId30"/>
+    <p:sldId id="341" r:id="rId31"/>
+    <p:sldId id="365" r:id="rId32"/>
+    <p:sldId id="366" r:id="rId33"/>
+    <p:sldId id="367" r:id="rId34"/>
+    <p:sldId id="368" r:id="rId35"/>
+    <p:sldId id="333" r:id="rId36"/>
+    <p:sldId id="323" r:id="rId37"/>
+    <p:sldId id="334" r:id="rId38"/>
+    <p:sldId id="337" r:id="rId39"/>
+    <p:sldId id="309" r:id="rId40"/>
   </p:sldIdLst>
   <p:sldSz cx="9144000" cy="5143500" type="screen16x9"/>
   <p:notesSz cx="6858000" cy="9144000"/>
@@ -1898,7 +1903,7 @@
     </p:spTree>
     <p:extLst>
       <p:ext uri="{BB962C8B-B14F-4D97-AF65-F5344CB8AC3E}">
-        <p14:creationId xmlns:p14="http://schemas.microsoft.com/office/powerpoint/2010/main" val="3603767268"/>
+        <p14:creationId xmlns:p14="http://schemas.microsoft.com/office/powerpoint/2010/main" val="2069260822"/>
       </p:ext>
     </p:extLst>
   </p:cSld>
@@ -1964,7 +1969,7 @@
     </p:spTree>
     <p:extLst>
       <p:ext uri="{BB962C8B-B14F-4D97-AF65-F5344CB8AC3E}">
-        <p14:creationId xmlns:p14="http://schemas.microsoft.com/office/powerpoint/2010/main" val="585304384"/>
+        <p14:creationId xmlns:p14="http://schemas.microsoft.com/office/powerpoint/2010/main" val="3603767268"/>
       </p:ext>
     </p:extLst>
   </p:cSld>
@@ -2096,7 +2101,7 @@
     </p:spTree>
     <p:extLst>
       <p:ext uri="{BB962C8B-B14F-4D97-AF65-F5344CB8AC3E}">
-        <p14:creationId xmlns:p14="http://schemas.microsoft.com/office/powerpoint/2010/main" val="2709569597"/>
+        <p14:creationId xmlns:p14="http://schemas.microsoft.com/office/powerpoint/2010/main" val="3775760816"/>
       </p:ext>
     </p:extLst>
   </p:cSld>
@@ -2162,6 +2167,336 @@
     </p:spTree>
     <p:extLst>
       <p:ext uri="{BB962C8B-B14F-4D97-AF65-F5344CB8AC3E}">
+        <p14:creationId xmlns:p14="http://schemas.microsoft.com/office/powerpoint/2010/main" val="872966617"/>
+      </p:ext>
+    </p:extLst>
+  </p:cSld>
+  <p:clrMapOvr>
+    <a:masterClrMapping/>
+  </p:clrMapOvr>
+</p:notes>
+</file>
+
+<file path=ppt/notesSlides/notesSlide32.xml><?xml version="1.0" encoding="utf-8"?>
+<p:notes xmlns:a="http://schemas.openxmlformats.org/drawingml/2006/main" xmlns:r="http://schemas.openxmlformats.org/officeDocument/2006/relationships" xmlns:p="http://schemas.openxmlformats.org/presentationml/2006/main">
+  <p:cSld>
+    <p:spTree>
+      <p:nvGrpSpPr>
+        <p:cNvPr id="1" name=""/>
+        <p:cNvGrpSpPr/>
+        <p:nvPr/>
+      </p:nvGrpSpPr>
+      <p:grpSpPr>
+        <a:xfrm>
+          <a:off x="0" y="0"/>
+          <a:ext cx="0" cy="0"/>
+          <a:chOff x="0" y="0"/>
+          <a:chExt cx="0" cy="0"/>
+        </a:xfrm>
+      </p:grpSpPr>
+      <p:sp>
+        <p:nvSpPr>
+          <p:cNvPr id="2" name="Espaço Reservado para Imagem de Slide 1"/>
+          <p:cNvSpPr>
+            <a:spLocks noGrp="1" noRot="1" noChangeAspect="1"/>
+          </p:cNvSpPr>
+          <p:nvPr>
+            <p:ph type="sldImg"/>
+          </p:nvPr>
+        </p:nvSpPr>
+        <p:spPr>
+          <a:xfrm>
+            <a:off x="381000" y="685800"/>
+            <a:ext cx="6096000" cy="3429000"/>
+          </a:xfrm>
+        </p:spPr>
+      </p:sp>
+      <p:sp>
+        <p:nvSpPr>
+          <p:cNvPr id="3" name="Espaço Reservado para Anotações 2"/>
+          <p:cNvSpPr>
+            <a:spLocks noGrp="1"/>
+          </p:cNvSpPr>
+          <p:nvPr>
+            <p:ph type="body" idx="1"/>
+          </p:nvPr>
+        </p:nvSpPr>
+        <p:spPr/>
+        <p:txBody>
+          <a:bodyPr/>
+          <a:lstStyle/>
+          <a:p>
+            <a:endParaRPr lang="pt-BR" dirty="0"/>
+          </a:p>
+        </p:txBody>
+      </p:sp>
+    </p:spTree>
+    <p:extLst>
+      <p:ext uri="{BB962C8B-B14F-4D97-AF65-F5344CB8AC3E}">
+        <p14:creationId xmlns:p14="http://schemas.microsoft.com/office/powerpoint/2010/main" val="197476926"/>
+      </p:ext>
+    </p:extLst>
+  </p:cSld>
+  <p:clrMapOvr>
+    <a:masterClrMapping/>
+  </p:clrMapOvr>
+</p:notes>
+</file>
+
+<file path=ppt/notesSlides/notesSlide33.xml><?xml version="1.0" encoding="utf-8"?>
+<p:notes xmlns:a="http://schemas.openxmlformats.org/drawingml/2006/main" xmlns:r="http://schemas.openxmlformats.org/officeDocument/2006/relationships" xmlns:p="http://schemas.openxmlformats.org/presentationml/2006/main">
+  <p:cSld>
+    <p:spTree>
+      <p:nvGrpSpPr>
+        <p:cNvPr id="1" name=""/>
+        <p:cNvGrpSpPr/>
+        <p:nvPr/>
+      </p:nvGrpSpPr>
+      <p:grpSpPr>
+        <a:xfrm>
+          <a:off x="0" y="0"/>
+          <a:ext cx="0" cy="0"/>
+          <a:chOff x="0" y="0"/>
+          <a:chExt cx="0" cy="0"/>
+        </a:xfrm>
+      </p:grpSpPr>
+      <p:sp>
+        <p:nvSpPr>
+          <p:cNvPr id="2" name="Espaço Reservado para Imagem de Slide 1"/>
+          <p:cNvSpPr>
+            <a:spLocks noGrp="1" noRot="1" noChangeAspect="1"/>
+          </p:cNvSpPr>
+          <p:nvPr>
+            <p:ph type="sldImg"/>
+          </p:nvPr>
+        </p:nvSpPr>
+        <p:spPr>
+          <a:xfrm>
+            <a:off x="381000" y="685800"/>
+            <a:ext cx="6096000" cy="3429000"/>
+          </a:xfrm>
+        </p:spPr>
+      </p:sp>
+      <p:sp>
+        <p:nvSpPr>
+          <p:cNvPr id="3" name="Espaço Reservado para Anotações 2"/>
+          <p:cNvSpPr>
+            <a:spLocks noGrp="1"/>
+          </p:cNvSpPr>
+          <p:nvPr>
+            <p:ph type="body" idx="1"/>
+          </p:nvPr>
+        </p:nvSpPr>
+        <p:spPr/>
+        <p:txBody>
+          <a:bodyPr/>
+          <a:lstStyle/>
+          <a:p>
+            <a:endParaRPr lang="pt-BR" dirty="0"/>
+          </a:p>
+        </p:txBody>
+      </p:sp>
+    </p:spTree>
+    <p:extLst>
+      <p:ext uri="{BB962C8B-B14F-4D97-AF65-F5344CB8AC3E}">
+        <p14:creationId xmlns:p14="http://schemas.microsoft.com/office/powerpoint/2010/main" val="682890746"/>
+      </p:ext>
+    </p:extLst>
+  </p:cSld>
+  <p:clrMapOvr>
+    <a:masterClrMapping/>
+  </p:clrMapOvr>
+</p:notes>
+</file>
+
+<file path=ppt/notesSlides/notesSlide34.xml><?xml version="1.0" encoding="utf-8"?>
+<p:notes xmlns:a="http://schemas.openxmlformats.org/drawingml/2006/main" xmlns:r="http://schemas.openxmlformats.org/officeDocument/2006/relationships" xmlns:p="http://schemas.openxmlformats.org/presentationml/2006/main">
+  <p:cSld>
+    <p:spTree>
+      <p:nvGrpSpPr>
+        <p:cNvPr id="1" name=""/>
+        <p:cNvGrpSpPr/>
+        <p:nvPr/>
+      </p:nvGrpSpPr>
+      <p:grpSpPr>
+        <a:xfrm>
+          <a:off x="0" y="0"/>
+          <a:ext cx="0" cy="0"/>
+          <a:chOff x="0" y="0"/>
+          <a:chExt cx="0" cy="0"/>
+        </a:xfrm>
+      </p:grpSpPr>
+      <p:sp>
+        <p:nvSpPr>
+          <p:cNvPr id="2" name="Espaço Reservado para Imagem de Slide 1"/>
+          <p:cNvSpPr>
+            <a:spLocks noGrp="1" noRot="1" noChangeAspect="1"/>
+          </p:cNvSpPr>
+          <p:nvPr>
+            <p:ph type="sldImg"/>
+          </p:nvPr>
+        </p:nvSpPr>
+        <p:spPr>
+          <a:xfrm>
+            <a:off x="381000" y="685800"/>
+            <a:ext cx="6096000" cy="3429000"/>
+          </a:xfrm>
+        </p:spPr>
+      </p:sp>
+      <p:sp>
+        <p:nvSpPr>
+          <p:cNvPr id="3" name="Espaço Reservado para Anotações 2"/>
+          <p:cNvSpPr>
+            <a:spLocks noGrp="1"/>
+          </p:cNvSpPr>
+          <p:nvPr>
+            <p:ph type="body" idx="1"/>
+          </p:nvPr>
+        </p:nvSpPr>
+        <p:spPr/>
+        <p:txBody>
+          <a:bodyPr/>
+          <a:lstStyle/>
+          <a:p>
+            <a:endParaRPr lang="pt-BR" dirty="0"/>
+          </a:p>
+        </p:txBody>
+      </p:sp>
+    </p:spTree>
+    <p:extLst>
+      <p:ext uri="{BB962C8B-B14F-4D97-AF65-F5344CB8AC3E}">
+        <p14:creationId xmlns:p14="http://schemas.microsoft.com/office/powerpoint/2010/main" val="585304384"/>
+      </p:ext>
+    </p:extLst>
+  </p:cSld>
+  <p:clrMapOvr>
+    <a:masterClrMapping/>
+  </p:clrMapOvr>
+</p:notes>
+</file>
+
+<file path=ppt/notesSlides/notesSlide35.xml><?xml version="1.0" encoding="utf-8"?>
+<p:notes xmlns:a="http://schemas.openxmlformats.org/drawingml/2006/main" xmlns:r="http://schemas.openxmlformats.org/officeDocument/2006/relationships" xmlns:p="http://schemas.openxmlformats.org/presentationml/2006/main">
+  <p:cSld>
+    <p:spTree>
+      <p:nvGrpSpPr>
+        <p:cNvPr id="1" name=""/>
+        <p:cNvGrpSpPr/>
+        <p:nvPr/>
+      </p:nvGrpSpPr>
+      <p:grpSpPr>
+        <a:xfrm>
+          <a:off x="0" y="0"/>
+          <a:ext cx="0" cy="0"/>
+          <a:chOff x="0" y="0"/>
+          <a:chExt cx="0" cy="0"/>
+        </a:xfrm>
+      </p:grpSpPr>
+      <p:sp>
+        <p:nvSpPr>
+          <p:cNvPr id="2" name="Espaço Reservado para Imagem de Slide 1"/>
+          <p:cNvSpPr>
+            <a:spLocks noGrp="1" noRot="1" noChangeAspect="1"/>
+          </p:cNvSpPr>
+          <p:nvPr>
+            <p:ph type="sldImg"/>
+          </p:nvPr>
+        </p:nvSpPr>
+        <p:spPr>
+          <a:xfrm>
+            <a:off x="381000" y="685800"/>
+            <a:ext cx="6096000" cy="3429000"/>
+          </a:xfrm>
+        </p:spPr>
+      </p:sp>
+      <p:sp>
+        <p:nvSpPr>
+          <p:cNvPr id="3" name="Espaço Reservado para Anotações 2"/>
+          <p:cNvSpPr>
+            <a:spLocks noGrp="1"/>
+          </p:cNvSpPr>
+          <p:nvPr>
+            <p:ph type="body" idx="1"/>
+          </p:nvPr>
+        </p:nvSpPr>
+        <p:spPr/>
+        <p:txBody>
+          <a:bodyPr/>
+          <a:lstStyle/>
+          <a:p>
+            <a:endParaRPr lang="pt-BR" dirty="0"/>
+          </a:p>
+        </p:txBody>
+      </p:sp>
+    </p:spTree>
+    <p:extLst>
+      <p:ext uri="{BB962C8B-B14F-4D97-AF65-F5344CB8AC3E}">
+        <p14:creationId xmlns:p14="http://schemas.microsoft.com/office/powerpoint/2010/main" val="2709569597"/>
+      </p:ext>
+    </p:extLst>
+  </p:cSld>
+  <p:clrMapOvr>
+    <a:masterClrMapping/>
+  </p:clrMapOvr>
+</p:notes>
+</file>
+
+<file path=ppt/notesSlides/notesSlide36.xml><?xml version="1.0" encoding="utf-8"?>
+<p:notes xmlns:a="http://schemas.openxmlformats.org/drawingml/2006/main" xmlns:r="http://schemas.openxmlformats.org/officeDocument/2006/relationships" xmlns:p="http://schemas.openxmlformats.org/presentationml/2006/main">
+  <p:cSld>
+    <p:spTree>
+      <p:nvGrpSpPr>
+        <p:cNvPr id="1" name=""/>
+        <p:cNvGrpSpPr/>
+        <p:nvPr/>
+      </p:nvGrpSpPr>
+      <p:grpSpPr>
+        <a:xfrm>
+          <a:off x="0" y="0"/>
+          <a:ext cx="0" cy="0"/>
+          <a:chOff x="0" y="0"/>
+          <a:chExt cx="0" cy="0"/>
+        </a:xfrm>
+      </p:grpSpPr>
+      <p:sp>
+        <p:nvSpPr>
+          <p:cNvPr id="2" name="Espaço Reservado para Imagem de Slide 1"/>
+          <p:cNvSpPr>
+            <a:spLocks noGrp="1" noRot="1" noChangeAspect="1"/>
+          </p:cNvSpPr>
+          <p:nvPr>
+            <p:ph type="sldImg"/>
+          </p:nvPr>
+        </p:nvSpPr>
+        <p:spPr>
+          <a:xfrm>
+            <a:off x="381000" y="685800"/>
+            <a:ext cx="6096000" cy="3429000"/>
+          </a:xfrm>
+        </p:spPr>
+      </p:sp>
+      <p:sp>
+        <p:nvSpPr>
+          <p:cNvPr id="3" name="Espaço Reservado para Anotações 2"/>
+          <p:cNvSpPr>
+            <a:spLocks noGrp="1"/>
+          </p:cNvSpPr>
+          <p:nvPr>
+            <p:ph type="body" idx="1"/>
+          </p:nvPr>
+        </p:nvSpPr>
+        <p:spPr/>
+        <p:txBody>
+          <a:bodyPr/>
+          <a:lstStyle/>
+          <a:p>
+            <a:endParaRPr lang="pt-BR" dirty="0"/>
+          </a:p>
+        </p:txBody>
+      </p:sp>
+    </p:spTree>
+    <p:extLst>
+      <p:ext uri="{BB962C8B-B14F-4D97-AF65-F5344CB8AC3E}">
         <p14:creationId xmlns:p14="http://schemas.microsoft.com/office/powerpoint/2010/main" val="2296249050"/>
       </p:ext>
     </p:extLst>
@@ -2172,7 +2507,7 @@
 </p:notes>
 </file>
 
-<file path=ppt/notesSlides/notesSlide32.xml><?xml version="1.0" encoding="utf-8"?>
+<file path=ppt/notesSlides/notesSlide37.xml><?xml version="1.0" encoding="utf-8"?>
 <p:notes xmlns:a="http://schemas.openxmlformats.org/drawingml/2006/main" xmlns:r="http://schemas.openxmlformats.org/officeDocument/2006/relationships" xmlns:p="http://schemas.openxmlformats.org/presentationml/2006/main">
   <p:cSld>
     <p:spTree>
@@ -12832,7 +13167,7 @@
                   <a:srgbClr val="0070C0"/>
                 </a:solidFill>
               </a:rPr>
-              <a:t>Características</a:t>
+              <a:t>Módulo</a:t>
             </a:r>
             <a:r>
               <a:rPr lang="en-US" b="1" dirty="0">
@@ -12840,7 +13175,7 @@
                   <a:srgbClr val="0070C0"/>
                 </a:solidFill>
               </a:rPr>
-              <a:t> da Ferramenta de </a:t>
+              <a:t> </a:t>
             </a:r>
             <a:r>
               <a:rPr lang="en-US" b="1" dirty="0" err="1">
@@ -12848,7 +13183,7 @@
                   <a:srgbClr val="0070C0"/>
                 </a:solidFill>
               </a:rPr>
-              <a:t>Simulação</a:t>
+              <a:t>Simulador</a:t>
             </a:r>
             <a:r>
               <a:rPr lang="en-US" b="1" dirty="0">
@@ -12856,7 +13191,7 @@
                   <a:srgbClr val="0070C0"/>
                 </a:solidFill>
               </a:rPr>
-              <a:t> </a:t>
+              <a:t> da Plataforma Arduino e CI da Tool </a:t>
             </a:r>
             <a:r>
               <a:rPr lang="en-US" b="1" dirty="0" err="1">
@@ -12864,16 +13199,13 @@
                   <a:srgbClr val="0070C0"/>
                 </a:solidFill>
               </a:rPr>
-              <a:t>PICSimLab</a:t>
-            </a:r>
-            <a:r>
-              <a:rPr lang="en-US" b="1" dirty="0">
-                <a:solidFill>
-                  <a:srgbClr val="0070C0"/>
-                </a:solidFill>
-              </a:rPr>
-              <a:t> CI PIC</a:t>
-            </a:r>
+              <a:t>Tinkercad</a:t>
+            </a:r>
+            <a:endParaRPr lang="en-US" b="1" dirty="0">
+              <a:solidFill>
+                <a:srgbClr val="0070C0"/>
+              </a:solidFill>
+            </a:endParaRPr>
           </a:p>
         </p:txBody>
       </p:sp>
@@ -12889,8 +13221,8 @@
         </p:nvSpPr>
         <p:spPr>
           <a:xfrm>
-            <a:off x="142865" y="1200150"/>
-            <a:ext cx="8865056" cy="3737370"/>
+            <a:off x="142865" y="1395222"/>
+            <a:ext cx="8865056" cy="3653296"/>
           </a:xfrm>
         </p:spPr>
         <p:txBody>
@@ -12902,23 +13234,50 @@
             <a:pPr marL="0" indent="0" algn="just">
               <a:buNone/>
             </a:pPr>
-            <a:r>
-              <a:rPr lang="pt-BR" sz="2000" dirty="0">
-                <a:solidFill>
-                  <a:schemeClr val="tx1"/>
-                </a:solidFill>
-                <a:latin typeface="Times New Roman" panose="02020603050405020304" pitchFamily="18" charset="0"/>
-                <a:cs typeface="Times New Roman" panose="02020603050405020304" pitchFamily="18" charset="0"/>
-              </a:rPr>
-              <a:t>Características ...</a:t>
-            </a:r>
+            <a:endParaRPr lang="pt-BR" sz="2000" dirty="0">
+              <a:solidFill>
+                <a:schemeClr val="tx1"/>
+              </a:solidFill>
+              <a:latin typeface="Times New Roman" panose="02020603050405020304" pitchFamily="18" charset="0"/>
+              <a:cs typeface="Times New Roman" panose="02020603050405020304" pitchFamily="18" charset="0"/>
+            </a:endParaRPr>
           </a:p>
         </p:txBody>
       </p:sp>
+      <p:pic>
+        <p:nvPicPr>
+          <p:cNvPr id="3" name="Imagem 2">
+            <a:extLst>
+              <a:ext uri="{FF2B5EF4-FFF2-40B4-BE49-F238E27FC236}">
+                <a16:creationId xmlns:a16="http://schemas.microsoft.com/office/drawing/2014/main" id="{AC3DC84B-0383-9EFC-0BC1-FB70E21A181A}"/>
+              </a:ext>
+            </a:extLst>
+          </p:cNvPr>
+          <p:cNvPicPr>
+            <a:picLocks noChangeAspect="1"/>
+          </p:cNvPicPr>
+          <p:nvPr/>
+        </p:nvPicPr>
+        <p:blipFill>
+          <a:blip r:embed="rId3"/>
+          <a:stretch>
+            <a:fillRect/>
+          </a:stretch>
+        </p:blipFill>
+        <p:spPr>
+          <a:xfrm>
+            <a:off x="174716" y="1563834"/>
+            <a:ext cx="6895785" cy="3326913"/>
+          </a:xfrm>
+          <a:prstGeom prst="rect">
+            <a:avLst/>
+          </a:prstGeom>
+        </p:spPr>
+      </p:pic>
     </p:spTree>
     <p:extLst>
       <p:ext uri="{BB962C8B-B14F-4D97-AF65-F5344CB8AC3E}">
-        <p14:creationId xmlns:p14="http://schemas.microsoft.com/office/powerpoint/2010/main" val="2791554997"/>
+        <p14:creationId xmlns:p14="http://schemas.microsoft.com/office/powerpoint/2010/main" val="122018930"/>
       </p:ext>
     </p:extLst>
   </p:cSld>
@@ -13271,7 +13630,7 @@
         </p:spPr>
         <p:txBody>
           <a:bodyPr>
-            <a:normAutofit/>
+            <a:normAutofit fontScale="90000"/>
           </a:bodyPr>
           <a:lstStyle/>
           <a:p>
@@ -13281,7 +13640,7 @@
                   <a:srgbClr val="0070C0"/>
                 </a:solidFill>
               </a:rPr>
-              <a:t>Leitura</a:t>
+              <a:t>Características</a:t>
             </a:r>
             <a:r>
               <a:rPr lang="en-US" b="1" dirty="0">
@@ -13289,6 +13648,22 @@
                   <a:srgbClr val="0070C0"/>
                 </a:solidFill>
               </a:rPr>
+              <a:t> da Ferramenta de </a:t>
+            </a:r>
+            <a:r>
+              <a:rPr lang="en-US" b="1" dirty="0" err="1">
+                <a:solidFill>
+                  <a:srgbClr val="0070C0"/>
+                </a:solidFill>
+              </a:rPr>
+              <a:t>Simulação</a:t>
+            </a:r>
+            <a:r>
+              <a:rPr lang="en-US" b="1" dirty="0">
+                <a:solidFill>
+                  <a:srgbClr val="0070C0"/>
+                </a:solidFill>
+              </a:rPr>
               <a:t> </a:t>
             </a:r>
             <a:r>
@@ -13297,13 +13672,16 @@
                   <a:srgbClr val="0070C0"/>
                 </a:solidFill>
               </a:rPr>
-              <a:t>Específica</a:t>
-            </a:r>
-            <a:endParaRPr lang="en-US" b="1" dirty="0">
-              <a:solidFill>
-                <a:srgbClr val="0070C0"/>
-              </a:solidFill>
-            </a:endParaRPr>
+              <a:t>PICSimLab</a:t>
+            </a:r>
+            <a:r>
+              <a:rPr lang="en-US" b="1" dirty="0">
+                <a:solidFill>
+                  <a:srgbClr val="0070C0"/>
+                </a:solidFill>
+              </a:rPr>
+              <a:t> CI PIC</a:t>
+            </a:r>
           </a:p>
         </p:txBody>
       </p:sp>
@@ -13320,7 +13698,7 @@
         <p:spPr>
           <a:xfrm>
             <a:off x="142865" y="1200150"/>
-            <a:ext cx="8865056" cy="3737369"/>
+            <a:ext cx="8865056" cy="3737370"/>
           </a:xfrm>
         </p:spPr>
         <p:txBody>
@@ -13333,36 +13711,54 @@
               <a:buNone/>
             </a:pPr>
             <a:r>
-              <a:rPr lang="pt-BR" sz="2000" dirty="0">
-                <a:latin typeface="Times New Roman" panose="02020603050405020304" pitchFamily="18" charset="0"/>
-                <a:cs typeface="Times New Roman" panose="02020603050405020304" pitchFamily="18" charset="0"/>
-              </a:rPr>
-              <a:t>[1] Sistemas Embarcados.</a:t>
-            </a:r>
-          </a:p>
-          <a:p>
-            <a:pPr marL="0" indent="0" algn="just">
-              <a:buNone/>
-            </a:pPr>
+              <a:rPr lang="pt-BR" sz="2000" b="1" dirty="0" err="1">
+                <a:solidFill>
+                  <a:srgbClr val="FF0000"/>
+                </a:solidFill>
+                <a:latin typeface="Times New Roman" panose="02020603050405020304" pitchFamily="18" charset="0"/>
+                <a:cs typeface="Times New Roman" panose="02020603050405020304" pitchFamily="18" charset="0"/>
+              </a:rPr>
+              <a:t>Picsimlab</a:t>
+            </a:r>
+            <a:r>
+              <a:rPr lang="pt-BR" sz="2000" dirty="0">
+                <a:solidFill>
+                  <a:schemeClr val="tx1"/>
+                </a:solidFill>
+                <a:latin typeface="Times New Roman" panose="02020603050405020304" pitchFamily="18" charset="0"/>
+                <a:cs typeface="Times New Roman" panose="02020603050405020304" pitchFamily="18" charset="0"/>
+              </a:rPr>
+              <a:t> é um emulador em tempo real de placas de desenvolvimento criado em </a:t>
+            </a:r>
             <a:r>
               <a:rPr lang="pt-BR" sz="2000" b="1" dirty="0">
                 <a:solidFill>
-                  <a:srgbClr val="FF0000"/>
-                </a:solidFill>
-                <a:latin typeface="Times New Roman" panose="02020603050405020304" pitchFamily="18" charset="0"/>
-                <a:cs typeface="Times New Roman" panose="02020603050405020304" pitchFamily="18" charset="0"/>
-              </a:rPr>
-              <a:t>Disponível em: </a:t>
-            </a:r>
-            <a:r>
-              <a:rPr lang="pt-BR" sz="2000" dirty="0">
-                <a:latin typeface="Times New Roman" panose="02020603050405020304" pitchFamily="18" charset="0"/>
-                <a:cs typeface="Times New Roman" panose="02020603050405020304" pitchFamily="18" charset="0"/>
-                <a:hlinkClick r:id="rId3"/>
-              </a:rPr>
-              <a:t>https://files.comunidades.net/mutcom/ARTIGO_SIST_EMB.pdf</a:t>
-            </a:r>
+                  <a:schemeClr val="tx1"/>
+                </a:solidFill>
+                <a:latin typeface="Times New Roman" panose="02020603050405020304" pitchFamily="18" charset="0"/>
+                <a:cs typeface="Times New Roman" panose="02020603050405020304" pitchFamily="18" charset="0"/>
+              </a:rPr>
+              <a:t>2008</a:t>
+            </a:r>
+            <a:r>
+              <a:rPr lang="pt-BR" sz="2000" dirty="0">
+                <a:solidFill>
+                  <a:schemeClr val="tx1"/>
+                </a:solidFill>
+                <a:latin typeface="Times New Roman" panose="02020603050405020304" pitchFamily="18" charset="0"/>
+                <a:cs typeface="Times New Roman" panose="02020603050405020304" pitchFamily="18" charset="0"/>
+              </a:rPr>
+              <a:t> com objetivo de simular projetos didáticos e introduzir uma visualização prévia da prática de uma forma simples e ágil. </a:t>
+            </a:r>
+          </a:p>
+          <a:p>
+            <a:pPr marL="0" indent="0" algn="just">
+              <a:buNone/>
+            </a:pPr>
             <a:endParaRPr lang="pt-BR" sz="2000" dirty="0">
+              <a:solidFill>
+                <a:schemeClr val="tx1"/>
+              </a:solidFill>
               <a:latin typeface="Times New Roman" panose="02020603050405020304" pitchFamily="18" charset="0"/>
               <a:cs typeface="Times New Roman" panose="02020603050405020304" pitchFamily="18" charset="0"/>
             </a:endParaRPr>
@@ -13371,7 +13767,65 @@
             <a:pPr marL="0" indent="0" algn="just">
               <a:buNone/>
             </a:pPr>
+            <a:r>
+              <a:rPr lang="pt-BR" sz="2000" dirty="0">
+                <a:solidFill>
+                  <a:schemeClr val="tx1"/>
+                </a:solidFill>
+                <a:latin typeface="Times New Roman" panose="02020603050405020304" pitchFamily="18" charset="0"/>
+                <a:cs typeface="Times New Roman" panose="02020603050405020304" pitchFamily="18" charset="0"/>
+              </a:rPr>
+              <a:t>Ele nos oferece algumas opções de </a:t>
+            </a:r>
+            <a:r>
+              <a:rPr lang="pt-BR" sz="2000" b="1" dirty="0">
+                <a:solidFill>
+                  <a:schemeClr val="tx1"/>
+                </a:solidFill>
+                <a:latin typeface="Times New Roman" panose="02020603050405020304" pitchFamily="18" charset="0"/>
+                <a:cs typeface="Times New Roman" panose="02020603050405020304" pitchFamily="18" charset="0"/>
+              </a:rPr>
+              <a:t>microcontroladores e componentes</a:t>
+            </a:r>
+            <a:r>
+              <a:rPr lang="pt-BR" sz="2000" dirty="0">
+                <a:solidFill>
+                  <a:schemeClr val="tx1"/>
+                </a:solidFill>
+                <a:latin typeface="Times New Roman" panose="02020603050405020304" pitchFamily="18" charset="0"/>
+                <a:cs typeface="Times New Roman" panose="02020603050405020304" pitchFamily="18" charset="0"/>
+              </a:rPr>
+              <a:t> predefinidos em placas de desenvolvimento, muito usado para </a:t>
+            </a:r>
+            <a:r>
+              <a:rPr lang="pt-BR" sz="2000" b="1" dirty="0">
+                <a:solidFill>
+                  <a:srgbClr val="FF0000"/>
+                </a:solidFill>
+                <a:latin typeface="Times New Roman" panose="02020603050405020304" pitchFamily="18" charset="0"/>
+                <a:cs typeface="Times New Roman" panose="02020603050405020304" pitchFamily="18" charset="0"/>
+              </a:rPr>
+              <a:t>simular projetos básicos em PIC</a:t>
+            </a:r>
+            <a:r>
+              <a:rPr lang="pt-BR" sz="2000" dirty="0">
+                <a:solidFill>
+                  <a:schemeClr val="tx1"/>
+                </a:solidFill>
+                <a:latin typeface="Times New Roman" panose="02020603050405020304" pitchFamily="18" charset="0"/>
+                <a:cs typeface="Times New Roman" panose="02020603050405020304" pitchFamily="18" charset="0"/>
+              </a:rPr>
+              <a:t>.</a:t>
+            </a:r>
+          </a:p>
+          <a:p>
+            <a:pPr marL="0" indent="0" algn="just">
+              <a:buNone/>
+            </a:pPr>
             <a:endParaRPr lang="pt-BR" sz="2000" dirty="0">
+              <a:solidFill>
+                <a:schemeClr val="tx1"/>
+              </a:solidFill>
               <a:latin typeface="Times New Roman" panose="02020603050405020304" pitchFamily="18" charset="0"/>
               <a:cs typeface="Times New Roman" panose="02020603050405020304" pitchFamily="18" charset="0"/>
             </a:endParaRPr>
@@ -13380,60 +13834,56 @@
             <a:pPr marL="0" indent="0" algn="just">
               <a:buNone/>
             </a:pPr>
+            <a:r>
+              <a:rPr lang="pt-BR" sz="2000" b="1" dirty="0">
+                <a:solidFill>
+                  <a:srgbClr val="FF0000"/>
+                </a:solidFill>
+                <a:latin typeface="Times New Roman" panose="02020603050405020304" pitchFamily="18" charset="0"/>
+                <a:cs typeface="Times New Roman" panose="02020603050405020304" pitchFamily="18" charset="0"/>
+              </a:rPr>
+              <a:t>Instalador</a:t>
+            </a:r>
+            <a:r>
+              <a:rPr lang="pt-BR" sz="2000" dirty="0">
+                <a:solidFill>
+                  <a:schemeClr val="tx1"/>
+                </a:solidFill>
+                <a:latin typeface="Times New Roman" panose="02020603050405020304" pitchFamily="18" charset="0"/>
+                <a:cs typeface="Times New Roman" panose="02020603050405020304" pitchFamily="18" charset="0"/>
+              </a:rPr>
+              <a:t>:</a:t>
+            </a:r>
+          </a:p>
+          <a:p>
+            <a:pPr marL="0" indent="0" algn="just">
+              <a:buNone/>
+            </a:pPr>
+            <a:r>
+              <a:rPr lang="pt-BR" sz="2000" dirty="0">
+                <a:solidFill>
+                  <a:schemeClr val="tx1"/>
+                </a:solidFill>
+                <a:latin typeface="Times New Roman" panose="02020603050405020304" pitchFamily="18" charset="0"/>
+                <a:cs typeface="Times New Roman" panose="02020603050405020304" pitchFamily="18" charset="0"/>
+              </a:rPr>
+              <a:t> 			</a:t>
+            </a:r>
+            <a:r>
+              <a:rPr lang="pt-BR" sz="2000" dirty="0">
+                <a:solidFill>
+                  <a:schemeClr val="tx1"/>
+                </a:solidFill>
+                <a:latin typeface="Times New Roman" panose="02020603050405020304" pitchFamily="18" charset="0"/>
+                <a:cs typeface="Times New Roman" panose="02020603050405020304" pitchFamily="18" charset="0"/>
+                <a:hlinkClick r:id="rId3"/>
+              </a:rPr>
+              <a:t>https://sourceforge.net/projects/picsim/</a:t>
+            </a:r>
             <a:endParaRPr lang="pt-BR" sz="2000" dirty="0">
-              <a:latin typeface="Times New Roman" panose="02020603050405020304" pitchFamily="18" charset="0"/>
-              <a:cs typeface="Times New Roman" panose="02020603050405020304" pitchFamily="18" charset="0"/>
-            </a:endParaRPr>
-          </a:p>
-          <a:p>
-            <a:pPr marL="0" indent="0" algn="just">
-              <a:buNone/>
-            </a:pPr>
-            <a:r>
-              <a:rPr lang="pt-BR" sz="2000" dirty="0">
-                <a:latin typeface="Times New Roman" panose="02020603050405020304" pitchFamily="18" charset="0"/>
-                <a:cs typeface="Times New Roman" panose="02020603050405020304" pitchFamily="18" charset="0"/>
-              </a:rPr>
-              <a:t>[2] </a:t>
-            </a:r>
-            <a:r>
-              <a:rPr lang="pt-BR" sz="2000" dirty="0" err="1">
-                <a:latin typeface="Times New Roman" panose="02020603050405020304" pitchFamily="18" charset="0"/>
-                <a:cs typeface="Times New Roman" panose="02020603050405020304" pitchFamily="18" charset="0"/>
-              </a:rPr>
-              <a:t>Elicitação</a:t>
-            </a:r>
-            <a:r>
-              <a:rPr lang="pt-BR" sz="2000" dirty="0">
-                <a:latin typeface="Times New Roman" panose="02020603050405020304" pitchFamily="18" charset="0"/>
-                <a:cs typeface="Times New Roman" panose="02020603050405020304" pitchFamily="18" charset="0"/>
-              </a:rPr>
-              <a:t> e Especificação de Requisitos Sistemas Embarcados. </a:t>
-            </a:r>
-          </a:p>
-          <a:p>
-            <a:pPr marL="0" indent="0" algn="just">
-              <a:buNone/>
-            </a:pPr>
-            <a:r>
-              <a:rPr lang="pt-BR" sz="2000" b="1" dirty="0">
-                <a:solidFill>
-                  <a:srgbClr val="FF0000"/>
-                </a:solidFill>
-                <a:latin typeface="Times New Roman" panose="02020603050405020304" pitchFamily="18" charset="0"/>
-                <a:cs typeface="Times New Roman" panose="02020603050405020304" pitchFamily="18" charset="0"/>
-              </a:rPr>
-              <a:t>Disponível em: </a:t>
-            </a:r>
-            <a:r>
-              <a:rPr lang="pt-BR" sz="2000" dirty="0">
-                <a:latin typeface="Times New Roman" panose="02020603050405020304" pitchFamily="18" charset="0"/>
-                <a:cs typeface="Times New Roman" panose="02020603050405020304" pitchFamily="18" charset="0"/>
-                <a:hlinkClick r:id="rId4"/>
-              </a:rPr>
-              <a:t>https://eventos.spc.org.pe/cibse2015/pdfs/07_WER15.pdf</a:t>
-            </a:r>
-            <a:endParaRPr lang="pt-BR" sz="2000" dirty="0">
+              <a:solidFill>
+                <a:schemeClr val="tx1"/>
+              </a:solidFill>
               <a:latin typeface="Times New Roman" panose="02020603050405020304" pitchFamily="18" charset="0"/>
               <a:cs typeface="Times New Roman" panose="02020603050405020304" pitchFamily="18" charset="0"/>
             </a:endParaRPr>
@@ -13443,7 +13893,7 @@
     </p:spTree>
     <p:extLst>
       <p:ext uri="{BB962C8B-B14F-4D97-AF65-F5344CB8AC3E}">
-        <p14:creationId xmlns:p14="http://schemas.microsoft.com/office/powerpoint/2010/main" val="3680270425"/>
+        <p14:creationId xmlns:p14="http://schemas.microsoft.com/office/powerpoint/2010/main" val="2791554997"/>
       </p:ext>
     </p:extLst>
   </p:cSld>
@@ -13489,7 +13939,7 @@
         </p:spPr>
         <p:txBody>
           <a:bodyPr>
-            <a:normAutofit/>
+            <a:normAutofit fontScale="90000"/>
           </a:bodyPr>
           <a:lstStyle/>
           <a:p>
@@ -13499,7 +13949,7 @@
                   <a:srgbClr val="0070C0"/>
                 </a:solidFill>
               </a:rPr>
-              <a:t>Aprenda</a:t>
+              <a:t>Características</a:t>
             </a:r>
             <a:r>
               <a:rPr lang="en-US" b="1" dirty="0">
@@ -13507,7 +13957,39 @@
                   <a:srgbClr val="0070C0"/>
                 </a:solidFill>
               </a:rPr>
-              <a:t>+</a:t>
+              <a:t> da Ferramenta de </a:t>
+            </a:r>
+            <a:r>
+              <a:rPr lang="en-US" b="1" dirty="0" err="1">
+                <a:solidFill>
+                  <a:srgbClr val="0070C0"/>
+                </a:solidFill>
+              </a:rPr>
+              <a:t>Simulação</a:t>
+            </a:r>
+            <a:r>
+              <a:rPr lang="en-US" b="1" dirty="0">
+                <a:solidFill>
+                  <a:srgbClr val="0070C0"/>
+                </a:solidFill>
+              </a:rPr>
+              <a:t> </a:t>
+            </a:r>
+            <a:r>
+              <a:rPr lang="en-US" b="1" dirty="0" err="1">
+                <a:solidFill>
+                  <a:srgbClr val="0070C0"/>
+                </a:solidFill>
+              </a:rPr>
+              <a:t>PICSimLab</a:t>
+            </a:r>
+            <a:r>
+              <a:rPr lang="en-US" b="1" dirty="0">
+                <a:solidFill>
+                  <a:srgbClr val="0070C0"/>
+                </a:solidFill>
+              </a:rPr>
+              <a:t> CI PIC</a:t>
             </a:r>
           </a:p>
         </p:txBody>
@@ -13538,93 +14020,158 @@
               <a:buNone/>
             </a:pPr>
             <a:r>
-              <a:rPr lang="pt-BR" sz="2400" dirty="0">
-                <a:latin typeface="Times New Roman" panose="02020603050405020304" pitchFamily="18" charset="0"/>
-                <a:cs typeface="Times New Roman" panose="02020603050405020304" pitchFamily="18" charset="0"/>
-              </a:rPr>
-              <a:t>[1] Cursos Sistemas Embarcados - Microcontroladores</a:t>
-            </a:r>
-          </a:p>
-          <a:p>
-            <a:pPr marL="0" indent="0" algn="just">
-              <a:buNone/>
-            </a:pPr>
-            <a:r>
-              <a:rPr lang="pt-BR" sz="2400" b="1" dirty="0">
+              <a:rPr lang="pt-BR" sz="2000" b="1" dirty="0" err="1">
                 <a:solidFill>
                   <a:srgbClr val="FF0000"/>
                 </a:solidFill>
                 <a:latin typeface="Times New Roman" panose="02020603050405020304" pitchFamily="18" charset="0"/>
                 <a:cs typeface="Times New Roman" panose="02020603050405020304" pitchFamily="18" charset="0"/>
               </a:rPr>
-              <a:t>Disponível em: </a:t>
-            </a:r>
-            <a:r>
-              <a:rPr lang="pt-BR" sz="2400" dirty="0">
-                <a:latin typeface="Times New Roman" panose="02020603050405020304" pitchFamily="18" charset="0"/>
-                <a:cs typeface="Times New Roman" panose="02020603050405020304" pitchFamily="18" charset="0"/>
-                <a:hlinkClick r:id="rId3"/>
-              </a:rPr>
-              <a:t>https://embarcados.com.br/cursos/</a:t>
-            </a:r>
-            <a:endParaRPr lang="pt-BR" sz="2400" dirty="0">
+              <a:t>PICSimLab</a:t>
+            </a:r>
+            <a:r>
+              <a:rPr lang="pt-BR" sz="2000" dirty="0">
+                <a:solidFill>
+                  <a:schemeClr val="tx1"/>
+                </a:solidFill>
+                <a:latin typeface="Times New Roman" panose="02020603050405020304" pitchFamily="18" charset="0"/>
+                <a:cs typeface="Times New Roman" panose="02020603050405020304" pitchFamily="18" charset="0"/>
+              </a:rPr>
+              <a:t> suporta microcontroladores: </a:t>
+            </a:r>
+          </a:p>
+          <a:p>
+            <a:pPr marL="0" indent="0" algn="just">
+              <a:buNone/>
+            </a:pPr>
+            <a:endParaRPr lang="pt-BR" sz="2000" dirty="0">
+              <a:solidFill>
+                <a:schemeClr val="tx1"/>
+              </a:solidFill>
               <a:latin typeface="Times New Roman" panose="02020603050405020304" pitchFamily="18" charset="0"/>
               <a:cs typeface="Times New Roman" panose="02020603050405020304" pitchFamily="18" charset="0"/>
             </a:endParaRPr>
           </a:p>
           <a:p>
-            <a:pPr marL="0" indent="0" algn="just">
-              <a:buNone/>
-            </a:pPr>
-            <a:endParaRPr lang="pt-BR" sz="2400" dirty="0">
+            <a:pPr algn="just">
+              <a:buFont typeface="Wingdings" panose="05000000000000000000" pitchFamily="2" charset="2"/>
+              <a:buChar char="§"/>
+            </a:pPr>
+            <a:r>
+              <a:rPr lang="pt-BR" sz="2000" dirty="0" err="1">
+                <a:solidFill>
+                  <a:schemeClr val="tx1"/>
+                </a:solidFill>
+                <a:latin typeface="Times New Roman" panose="02020603050405020304" pitchFamily="18" charset="0"/>
+                <a:cs typeface="Times New Roman" panose="02020603050405020304" pitchFamily="18" charset="0"/>
+              </a:rPr>
+              <a:t>Picsim</a:t>
+            </a:r>
+            <a:endParaRPr lang="pt-BR" sz="2000" dirty="0">
+              <a:solidFill>
+                <a:schemeClr val="tx1"/>
+              </a:solidFill>
               <a:latin typeface="Times New Roman" panose="02020603050405020304" pitchFamily="18" charset="0"/>
               <a:cs typeface="Times New Roman" panose="02020603050405020304" pitchFamily="18" charset="0"/>
             </a:endParaRPr>
           </a:p>
           <a:p>
-            <a:pPr marL="0" indent="0" algn="just">
-              <a:buNone/>
-            </a:pPr>
-            <a:endParaRPr lang="pt-BR" sz="2400" dirty="0">
+            <a:pPr algn="just">
+              <a:buFont typeface="Wingdings" panose="05000000000000000000" pitchFamily="2" charset="2"/>
+              <a:buChar char="§"/>
+            </a:pPr>
+            <a:r>
+              <a:rPr lang="pt-BR" sz="2000" dirty="0" err="1">
+                <a:solidFill>
+                  <a:schemeClr val="tx1"/>
+                </a:solidFill>
+                <a:latin typeface="Times New Roman" panose="02020603050405020304" pitchFamily="18" charset="0"/>
+                <a:cs typeface="Times New Roman" panose="02020603050405020304" pitchFamily="18" charset="0"/>
+              </a:rPr>
+              <a:t>Simavr</a:t>
+            </a:r>
+            <a:endParaRPr lang="pt-BR" sz="2000" dirty="0">
+              <a:solidFill>
+                <a:schemeClr val="tx1"/>
+              </a:solidFill>
               <a:latin typeface="Times New Roman" panose="02020603050405020304" pitchFamily="18" charset="0"/>
               <a:cs typeface="Times New Roman" panose="02020603050405020304" pitchFamily="18" charset="0"/>
             </a:endParaRPr>
           </a:p>
           <a:p>
-            <a:pPr marL="0" indent="0" algn="just">
-              <a:buNone/>
-            </a:pPr>
-            <a:r>
-              <a:rPr lang="pt-BR" sz="2400" dirty="0">
-                <a:latin typeface="Times New Roman" panose="02020603050405020304" pitchFamily="18" charset="0"/>
-                <a:cs typeface="Times New Roman" panose="02020603050405020304" pitchFamily="18" charset="0"/>
-              </a:rPr>
-              <a:t>[2] Arquitetura de Software para Sistemas Embarcados</a:t>
-            </a:r>
-          </a:p>
-          <a:p>
-            <a:pPr marL="0" indent="0" algn="just">
-              <a:buNone/>
-            </a:pPr>
-            <a:r>
-              <a:rPr lang="pt-BR" sz="2400" b="1" dirty="0">
-                <a:solidFill>
-                  <a:srgbClr val="FF0000"/>
-                </a:solidFill>
-                <a:latin typeface="Times New Roman" panose="02020603050405020304" pitchFamily="18" charset="0"/>
-                <a:cs typeface="Times New Roman" panose="02020603050405020304" pitchFamily="18" charset="0"/>
-              </a:rPr>
-              <a:t>Disponível em: </a:t>
-            </a:r>
-            <a:r>
-              <a:rPr lang="pt-BR" sz="2400" dirty="0">
-                <a:latin typeface="Times New Roman" panose="02020603050405020304" pitchFamily="18" charset="0"/>
-                <a:cs typeface="Times New Roman" panose="02020603050405020304" pitchFamily="18" charset="0"/>
-                <a:hlinkClick r:id="rId4"/>
-              </a:rPr>
-              <a:t>https://www.youtube.com/watch?v=UIAOR32H1vk</a:t>
-            </a:r>
-            <a:endParaRPr lang="pt-BR" sz="2400" dirty="0">
+            <a:pPr algn="just">
+              <a:buFont typeface="Wingdings" panose="05000000000000000000" pitchFamily="2" charset="2"/>
+              <a:buChar char="§"/>
+            </a:pPr>
+            <a:r>
+              <a:rPr lang="pt-BR" sz="2000" dirty="0" err="1">
+                <a:solidFill>
+                  <a:schemeClr val="tx1"/>
+                </a:solidFill>
+                <a:latin typeface="Times New Roman" panose="02020603050405020304" pitchFamily="18" charset="0"/>
+                <a:cs typeface="Times New Roman" panose="02020603050405020304" pitchFamily="18" charset="0"/>
+              </a:rPr>
+              <a:t>uCsim</a:t>
+            </a:r>
+            <a:endParaRPr lang="pt-BR" sz="2000" dirty="0">
+              <a:solidFill>
+                <a:schemeClr val="tx1"/>
+              </a:solidFill>
+              <a:latin typeface="Times New Roman" panose="02020603050405020304" pitchFamily="18" charset="0"/>
+              <a:cs typeface="Times New Roman" panose="02020603050405020304" pitchFamily="18" charset="0"/>
+            </a:endParaRPr>
+          </a:p>
+          <a:p>
+            <a:pPr algn="just">
+              <a:buFont typeface="Wingdings" panose="05000000000000000000" pitchFamily="2" charset="2"/>
+              <a:buChar char="§"/>
+            </a:pPr>
+            <a:r>
+              <a:rPr lang="pt-BR" sz="2000" dirty="0">
+                <a:solidFill>
+                  <a:schemeClr val="tx1"/>
+                </a:solidFill>
+                <a:latin typeface="Times New Roman" panose="02020603050405020304" pitchFamily="18" charset="0"/>
+                <a:cs typeface="Times New Roman" panose="02020603050405020304" pitchFamily="18" charset="0"/>
+              </a:rPr>
+              <a:t>Qemu-stm32</a:t>
+            </a:r>
+          </a:p>
+          <a:p>
+            <a:pPr algn="just">
+              <a:buFont typeface="Wingdings" panose="05000000000000000000" pitchFamily="2" charset="2"/>
+              <a:buChar char="§"/>
+            </a:pPr>
+            <a:r>
+              <a:rPr lang="pt-BR" sz="2000" dirty="0">
+                <a:solidFill>
+                  <a:schemeClr val="tx1"/>
+                </a:solidFill>
+                <a:latin typeface="Times New Roman" panose="02020603050405020304" pitchFamily="18" charset="0"/>
+                <a:cs typeface="Times New Roman" panose="02020603050405020304" pitchFamily="18" charset="0"/>
+              </a:rPr>
+              <a:t>Qemu-esp32</a:t>
+            </a:r>
+          </a:p>
+          <a:p>
+            <a:pPr algn="just">
+              <a:buFont typeface="Wingdings" panose="05000000000000000000" pitchFamily="2" charset="2"/>
+              <a:buChar char="§"/>
+            </a:pPr>
+            <a:r>
+              <a:rPr lang="pt-BR" sz="2000" dirty="0" err="1">
+                <a:solidFill>
+                  <a:schemeClr val="tx1"/>
+                </a:solidFill>
+                <a:latin typeface="Times New Roman" panose="02020603050405020304" pitchFamily="18" charset="0"/>
+                <a:cs typeface="Times New Roman" panose="02020603050405020304" pitchFamily="18" charset="0"/>
+              </a:rPr>
+              <a:t>Gpm</a:t>
+            </a:r>
+            <a:endParaRPr lang="pt-BR" sz="2000" dirty="0">
+              <a:solidFill>
+                <a:schemeClr val="tx1"/>
+              </a:solidFill>
               <a:latin typeface="Times New Roman" panose="02020603050405020304" pitchFamily="18" charset="0"/>
               <a:cs typeface="Times New Roman" panose="02020603050405020304" pitchFamily="18" charset="0"/>
             </a:endParaRPr>
@@ -13634,7 +14181,7 @@
     </p:spTree>
     <p:extLst>
       <p:ext uri="{BB962C8B-B14F-4D97-AF65-F5344CB8AC3E}">
-        <p14:creationId xmlns:p14="http://schemas.microsoft.com/office/powerpoint/2010/main" val="2747596967"/>
+        <p14:creationId xmlns:p14="http://schemas.microsoft.com/office/powerpoint/2010/main" val="2744477380"/>
       </p:ext>
     </p:extLst>
   </p:cSld>
@@ -13680,7 +14227,7 @@
         </p:spPr>
         <p:txBody>
           <a:bodyPr>
-            <a:normAutofit/>
+            <a:normAutofit fontScale="90000"/>
           </a:bodyPr>
           <a:lstStyle/>
           <a:p>
@@ -13690,7 +14237,7 @@
                   <a:srgbClr val="0070C0"/>
                 </a:solidFill>
               </a:rPr>
-              <a:t>Dinâmica</a:t>
+              <a:t>Características</a:t>
             </a:r>
             <a:r>
               <a:rPr lang="en-US" b="1" dirty="0">
@@ -13698,7 +14245,7 @@
                   <a:srgbClr val="0070C0"/>
                 </a:solidFill>
               </a:rPr>
-              <a:t>/</a:t>
+              <a:t> da Ferramenta de </a:t>
             </a:r>
             <a:r>
               <a:rPr lang="en-US" b="1" dirty="0" err="1">
@@ -13706,13 +14253,32 @@
                   <a:srgbClr val="0070C0"/>
                 </a:solidFill>
               </a:rPr>
-              <a:t>Atividades</a:t>
-            </a:r>
-            <a:endParaRPr lang="en-US" b="1" dirty="0">
-              <a:solidFill>
-                <a:srgbClr val="0070C0"/>
-              </a:solidFill>
-            </a:endParaRPr>
+              <a:t>Simulação</a:t>
+            </a:r>
+            <a:r>
+              <a:rPr lang="en-US" b="1" dirty="0">
+                <a:solidFill>
+                  <a:srgbClr val="0070C0"/>
+                </a:solidFill>
+              </a:rPr>
+              <a:t> </a:t>
+            </a:r>
+            <a:r>
+              <a:rPr lang="en-US" b="1" dirty="0" err="1">
+                <a:solidFill>
+                  <a:srgbClr val="0070C0"/>
+                </a:solidFill>
+              </a:rPr>
+              <a:t>PICSimLab</a:t>
+            </a:r>
+            <a:r>
+              <a:rPr lang="en-US" b="1" dirty="0">
+                <a:solidFill>
+                  <a:srgbClr val="0070C0"/>
+                </a:solidFill>
+              </a:rPr>
+              <a:t> CI PIC</a:t>
+            </a:r>
           </a:p>
         </p:txBody>
       </p:sp>
@@ -13728,8 +14294,8 @@
         </p:nvSpPr>
         <p:spPr>
           <a:xfrm>
-            <a:off x="139472" y="1063230"/>
-            <a:ext cx="8865056" cy="3606305"/>
+            <a:off x="142865" y="1200150"/>
+            <a:ext cx="8865056" cy="3737370"/>
           </a:xfrm>
         </p:spPr>
         <p:txBody>
@@ -13742,38 +14308,44 @@
               <a:buNone/>
             </a:pPr>
             <a:r>
-              <a:rPr lang="pt-BR" dirty="0">
-                <a:latin typeface="Times New Roman" panose="02020603050405020304" pitchFamily="18" charset="0"/>
-                <a:cs typeface="Times New Roman" panose="02020603050405020304" pitchFamily="18" charset="0"/>
-              </a:rPr>
-              <a:t>Exercícios (Atividade Verificadora de Aprendizagem)</a:t>
-            </a:r>
-          </a:p>
-          <a:p>
-            <a:pPr marL="0" indent="0" algn="just">
-              <a:buNone/>
-            </a:pPr>
-            <a:r>
-              <a:rPr lang="pt-BR" sz="2000" dirty="0">
-                <a:latin typeface="Times New Roman" panose="02020603050405020304" pitchFamily="18" charset="0"/>
-                <a:cs typeface="Times New Roman" panose="02020603050405020304" pitchFamily="18" charset="0"/>
-              </a:rPr>
-              <a:t> 	</a:t>
-            </a:r>
-          </a:p>
-          <a:p>
-            <a:pPr marL="0" indent="0" algn="just">
-              <a:buNone/>
-            </a:pPr>
-            <a:r>
-              <a:rPr lang="pt-BR" sz="2000" dirty="0">
-                <a:latin typeface="Times New Roman" panose="02020603050405020304" pitchFamily="18" charset="0"/>
-                <a:cs typeface="Times New Roman" panose="02020603050405020304" pitchFamily="18" charset="0"/>
-                <a:hlinkClick r:id="rId3"/>
-              </a:rPr>
-              <a:t>https://quizizz.com/admin/quiz/5aa686b4bc8374001abc8e88/sistemas-embarcados-e-microcontroladores</a:t>
-            </a:r>
+              <a:rPr lang="pt-BR" sz="2000" dirty="0">
+                <a:solidFill>
+                  <a:schemeClr val="tx1"/>
+                </a:solidFill>
+                <a:latin typeface="Times New Roman" panose="02020603050405020304" pitchFamily="18" charset="0"/>
+                <a:cs typeface="Times New Roman" panose="02020603050405020304" pitchFamily="18" charset="0"/>
+              </a:rPr>
+              <a:t>O </a:t>
+            </a:r>
+            <a:r>
+              <a:rPr lang="pt-BR" sz="2000" b="1" dirty="0" err="1">
+                <a:solidFill>
+                  <a:srgbClr val="FF0000"/>
+                </a:solidFill>
+                <a:latin typeface="Times New Roman" panose="02020603050405020304" pitchFamily="18" charset="0"/>
+                <a:cs typeface="Times New Roman" panose="02020603050405020304" pitchFamily="18" charset="0"/>
+              </a:rPr>
+              <a:t>PICSimLab</a:t>
+            </a:r>
+            <a:r>
+              <a:rPr lang="pt-BR" sz="2000" dirty="0">
+                <a:solidFill>
+                  <a:schemeClr val="tx1"/>
+                </a:solidFill>
+                <a:latin typeface="Times New Roman" panose="02020603050405020304" pitchFamily="18" charset="0"/>
+                <a:cs typeface="Times New Roman" panose="02020603050405020304" pitchFamily="18" charset="0"/>
+              </a:rPr>
+              <a:t> possui integração com MPLABX/Arduino IDE. </a:t>
+            </a:r>
+          </a:p>
+          <a:p>
+            <a:pPr marL="0" indent="0" algn="just">
+              <a:buNone/>
+            </a:pPr>
             <a:endParaRPr lang="pt-BR" sz="2000" dirty="0">
+              <a:solidFill>
+                <a:schemeClr val="tx1"/>
+              </a:solidFill>
               <a:latin typeface="Times New Roman" panose="02020603050405020304" pitchFamily="18" charset="0"/>
               <a:cs typeface="Times New Roman" panose="02020603050405020304" pitchFamily="18" charset="0"/>
             </a:endParaRPr>
@@ -13782,7 +14354,65 @@
             <a:pPr marL="0" indent="0" algn="just">
               <a:buNone/>
             </a:pPr>
+            <a:r>
+              <a:rPr lang="pt-BR" sz="2000" dirty="0">
+                <a:solidFill>
+                  <a:schemeClr val="tx1"/>
+                </a:solidFill>
+                <a:latin typeface="Times New Roman" panose="02020603050405020304" pitchFamily="18" charset="0"/>
+                <a:cs typeface="Times New Roman" panose="02020603050405020304" pitchFamily="18" charset="0"/>
+              </a:rPr>
+              <a:t>Como o objetivo do </a:t>
+            </a:r>
+            <a:r>
+              <a:rPr lang="pt-BR" sz="2000" b="1" dirty="0" err="1">
+                <a:solidFill>
+                  <a:srgbClr val="FF0000"/>
+                </a:solidFill>
+                <a:latin typeface="Times New Roman" panose="02020603050405020304" pitchFamily="18" charset="0"/>
+                <a:cs typeface="Times New Roman" panose="02020603050405020304" pitchFamily="18" charset="0"/>
+              </a:rPr>
+              <a:t>PICSimLab</a:t>
+            </a:r>
+            <a:r>
+              <a:rPr lang="pt-BR" sz="2000" dirty="0">
+                <a:solidFill>
+                  <a:schemeClr val="tx1"/>
+                </a:solidFill>
+                <a:latin typeface="Times New Roman" panose="02020603050405020304" pitchFamily="18" charset="0"/>
+                <a:cs typeface="Times New Roman" panose="02020603050405020304" pitchFamily="18" charset="0"/>
+              </a:rPr>
+              <a:t> é </a:t>
+            </a:r>
+            <a:r>
+              <a:rPr lang="pt-BR" sz="2000" b="1" dirty="0">
+                <a:solidFill>
+                  <a:schemeClr val="tx1"/>
+                </a:solidFill>
+                <a:latin typeface="Times New Roman" panose="02020603050405020304" pitchFamily="18" charset="0"/>
+                <a:cs typeface="Times New Roman" panose="02020603050405020304" pitchFamily="18" charset="0"/>
+              </a:rPr>
+              <a:t>emular hardware real</a:t>
+            </a:r>
+            <a:r>
+              <a:rPr lang="pt-BR" sz="2000" dirty="0">
+                <a:solidFill>
+                  <a:schemeClr val="tx1"/>
+                </a:solidFill>
+                <a:latin typeface="Times New Roman" panose="02020603050405020304" pitchFamily="18" charset="0"/>
+                <a:cs typeface="Times New Roman" panose="02020603050405020304" pitchFamily="18" charset="0"/>
+              </a:rPr>
+              <a:t>. </a:t>
+            </a:r>
+          </a:p>
+          <a:p>
+            <a:pPr marL="0" indent="0" algn="just">
+              <a:buNone/>
+            </a:pPr>
             <a:endParaRPr lang="pt-BR" sz="2000" dirty="0">
+              <a:solidFill>
+                <a:schemeClr val="tx1"/>
+              </a:solidFill>
               <a:latin typeface="Times New Roman" panose="02020603050405020304" pitchFamily="18" charset="0"/>
               <a:cs typeface="Times New Roman" panose="02020603050405020304" pitchFamily="18" charset="0"/>
             </a:endParaRPr>
@@ -13793,13 +14423,103 @@
             </a:pPr>
             <a:r>
               <a:rPr lang="pt-BR" sz="2000" dirty="0">
-                <a:latin typeface="Times New Roman" panose="02020603050405020304" pitchFamily="18" charset="0"/>
-                <a:cs typeface="Times New Roman" panose="02020603050405020304" pitchFamily="18" charset="0"/>
-                <a:hlinkClick r:id="rId4"/>
-              </a:rPr>
-              <a:t>https://quizizz.com/admin/quiz/5e8cb43dec5442001b4c12bd/revisao-de-compiladores-u1-e-u2</a:t>
-            </a:r>
+                <a:solidFill>
+                  <a:schemeClr val="tx1"/>
+                </a:solidFill>
+                <a:latin typeface="Times New Roman" panose="02020603050405020304" pitchFamily="18" charset="0"/>
+                <a:cs typeface="Times New Roman" panose="02020603050405020304" pitchFamily="18" charset="0"/>
+              </a:rPr>
+              <a:t>Para edição de código e depuração, as mesmas ferramentas usadas para uma placa real devem ser usadas com o </a:t>
+            </a:r>
+            <a:r>
+              <a:rPr lang="pt-BR" sz="2000" b="1" dirty="0" err="1">
+                <a:solidFill>
+                  <a:srgbClr val="FF0000"/>
+                </a:solidFill>
+                <a:latin typeface="Times New Roman" panose="02020603050405020304" pitchFamily="18" charset="0"/>
+                <a:cs typeface="Times New Roman" panose="02020603050405020304" pitchFamily="18" charset="0"/>
+              </a:rPr>
+              <a:t>PICSimLab</a:t>
+            </a:r>
+            <a:r>
+              <a:rPr lang="pt-BR" sz="2000" dirty="0">
+                <a:solidFill>
+                  <a:schemeClr val="tx1"/>
+                </a:solidFill>
+                <a:latin typeface="Times New Roman" panose="02020603050405020304" pitchFamily="18" charset="0"/>
+                <a:cs typeface="Times New Roman" panose="02020603050405020304" pitchFamily="18" charset="0"/>
+              </a:rPr>
+              <a:t>, como MPLABX, Arduino </a:t>
+            </a:r>
+            <a:r>
+              <a:rPr lang="pt-BR" sz="2000" b="1" dirty="0">
+                <a:solidFill>
+                  <a:schemeClr val="tx1"/>
+                </a:solidFill>
+                <a:latin typeface="Times New Roman" panose="02020603050405020304" pitchFamily="18" charset="0"/>
+                <a:cs typeface="Times New Roman" panose="02020603050405020304" pitchFamily="18" charset="0"/>
+              </a:rPr>
+              <a:t>IDE</a:t>
+            </a:r>
+            <a:r>
+              <a:rPr lang="pt-BR" sz="2000" dirty="0">
+                <a:solidFill>
+                  <a:schemeClr val="tx1"/>
+                </a:solidFill>
+                <a:latin typeface="Times New Roman" panose="02020603050405020304" pitchFamily="18" charset="0"/>
+                <a:cs typeface="Times New Roman" panose="02020603050405020304" pitchFamily="18" charset="0"/>
+              </a:rPr>
+              <a:t> ou </a:t>
+            </a:r>
+            <a:r>
+              <a:rPr lang="pt-BR" sz="2000" b="1" dirty="0" err="1">
+                <a:solidFill>
+                  <a:srgbClr val="FF0000"/>
+                </a:solidFill>
+                <a:latin typeface="Times New Roman" panose="02020603050405020304" pitchFamily="18" charset="0"/>
+                <a:cs typeface="Times New Roman" panose="02020603050405020304" pitchFamily="18" charset="0"/>
+              </a:rPr>
+              <a:t>VSCode</a:t>
+            </a:r>
+            <a:r>
+              <a:rPr lang="pt-BR" sz="2000" b="1" dirty="0">
+                <a:solidFill>
+                  <a:srgbClr val="FF0000"/>
+                </a:solidFill>
+                <a:latin typeface="Times New Roman" panose="02020603050405020304" pitchFamily="18" charset="0"/>
+                <a:cs typeface="Times New Roman" panose="02020603050405020304" pitchFamily="18" charset="0"/>
+              </a:rPr>
+              <a:t> com </a:t>
+            </a:r>
+            <a:r>
+              <a:rPr lang="pt-BR" sz="2000" b="1" dirty="0" err="1">
+                <a:solidFill>
+                  <a:srgbClr val="FF0000"/>
+                </a:solidFill>
+                <a:latin typeface="Times New Roman" panose="02020603050405020304" pitchFamily="18" charset="0"/>
+                <a:cs typeface="Times New Roman" panose="02020603050405020304" pitchFamily="18" charset="0"/>
+              </a:rPr>
+              <a:t>PlatformIO</a:t>
+            </a:r>
+            <a:r>
+              <a:rPr lang="pt-BR" sz="2000" dirty="0">
+                <a:solidFill>
+                  <a:schemeClr val="tx1"/>
+                </a:solidFill>
+                <a:latin typeface="Times New Roman" panose="02020603050405020304" pitchFamily="18" charset="0"/>
+                <a:cs typeface="Times New Roman" panose="02020603050405020304" pitchFamily="18" charset="0"/>
+              </a:rPr>
+              <a:t>.</a:t>
+            </a:r>
+          </a:p>
+          <a:p>
+            <a:pPr marL="0" indent="0" algn="just">
+              <a:buNone/>
+            </a:pPr>
             <a:endParaRPr lang="pt-BR" sz="2000" dirty="0">
+              <a:solidFill>
+                <a:schemeClr val="tx1"/>
+              </a:solidFill>
               <a:latin typeface="Times New Roman" panose="02020603050405020304" pitchFamily="18" charset="0"/>
               <a:cs typeface="Times New Roman" panose="02020603050405020304" pitchFamily="18" charset="0"/>
             </a:endParaRPr>
@@ -13808,7 +14528,33 @@
             <a:pPr marL="0" indent="0" algn="just">
               <a:buNone/>
             </a:pPr>
+            <a:r>
+              <a:rPr lang="pt-BR" sz="2000" dirty="0">
+                <a:solidFill>
+                  <a:schemeClr val="tx1"/>
+                </a:solidFill>
+                <a:latin typeface="Times New Roman" panose="02020603050405020304" pitchFamily="18" charset="0"/>
+                <a:cs typeface="Times New Roman" panose="02020603050405020304" pitchFamily="18" charset="0"/>
+                <a:hlinkClick r:id="rId3"/>
+              </a:rPr>
+              <a:t>https://blog.eletrogate.com/introducao-ao-simulador-picsimlab/</a:t>
+            </a:r>
             <a:endParaRPr lang="pt-BR" sz="2000" dirty="0">
+              <a:solidFill>
+                <a:schemeClr val="tx1"/>
+              </a:solidFill>
+              <a:latin typeface="Times New Roman" panose="02020603050405020304" pitchFamily="18" charset="0"/>
+              <a:cs typeface="Times New Roman" panose="02020603050405020304" pitchFamily="18" charset="0"/>
+            </a:endParaRPr>
+          </a:p>
+          <a:p>
+            <a:pPr marL="0" indent="0" algn="just">
+              <a:buNone/>
+            </a:pPr>
+            <a:endParaRPr lang="pt-BR" sz="2000" dirty="0">
+              <a:solidFill>
+                <a:schemeClr val="tx1"/>
+              </a:solidFill>
               <a:latin typeface="Times New Roman" panose="02020603050405020304" pitchFamily="18" charset="0"/>
               <a:cs typeface="Times New Roman" panose="02020603050405020304" pitchFamily="18" charset="0"/>
             </a:endParaRPr>
@@ -13818,7 +14564,7 @@
     </p:spTree>
     <p:extLst>
       <p:ext uri="{BB962C8B-B14F-4D97-AF65-F5344CB8AC3E}">
-        <p14:creationId xmlns:p14="http://schemas.microsoft.com/office/powerpoint/2010/main" val="2470652989"/>
+        <p14:creationId xmlns:p14="http://schemas.microsoft.com/office/powerpoint/2010/main" val="3613840724"/>
       </p:ext>
     </p:extLst>
   </p:cSld>
@@ -13864,6 +14610,566 @@
         </p:spPr>
         <p:txBody>
           <a:bodyPr>
+            <a:normAutofit fontScale="90000"/>
+          </a:bodyPr>
+          <a:lstStyle/>
+          <a:p>
+            <a:r>
+              <a:rPr lang="en-US" b="1" dirty="0" err="1">
+                <a:solidFill>
+                  <a:srgbClr val="0070C0"/>
+                </a:solidFill>
+              </a:rPr>
+              <a:t>Características</a:t>
+            </a:r>
+            <a:r>
+              <a:rPr lang="en-US" b="1" dirty="0">
+                <a:solidFill>
+                  <a:srgbClr val="0070C0"/>
+                </a:solidFill>
+              </a:rPr>
+              <a:t> da Ferramenta de </a:t>
+            </a:r>
+            <a:r>
+              <a:rPr lang="en-US" b="1" dirty="0" err="1">
+                <a:solidFill>
+                  <a:srgbClr val="0070C0"/>
+                </a:solidFill>
+              </a:rPr>
+              <a:t>Simulação</a:t>
+            </a:r>
+            <a:r>
+              <a:rPr lang="en-US" b="1" dirty="0">
+                <a:solidFill>
+                  <a:srgbClr val="0070C0"/>
+                </a:solidFill>
+              </a:rPr>
+              <a:t> </a:t>
+            </a:r>
+            <a:r>
+              <a:rPr lang="en-US" b="1" dirty="0" err="1">
+                <a:solidFill>
+                  <a:srgbClr val="0070C0"/>
+                </a:solidFill>
+              </a:rPr>
+              <a:t>PICSimLab</a:t>
+            </a:r>
+            <a:r>
+              <a:rPr lang="en-US" b="1" dirty="0">
+                <a:solidFill>
+                  <a:srgbClr val="0070C0"/>
+                </a:solidFill>
+              </a:rPr>
+              <a:t> CI PIC</a:t>
+            </a:r>
+          </a:p>
+        </p:txBody>
+      </p:sp>
+      <p:sp>
+        <p:nvSpPr>
+          <p:cNvPr id="8" name="Text Placeholder 2"/>
+          <p:cNvSpPr>
+            <a:spLocks noGrp="1"/>
+          </p:cNvSpPr>
+          <p:nvPr>
+            <p:ph type="body" sz="half" idx="1"/>
+          </p:nvPr>
+        </p:nvSpPr>
+        <p:spPr>
+          <a:xfrm>
+            <a:off x="142865" y="1200150"/>
+            <a:ext cx="8865056" cy="3835146"/>
+          </a:xfrm>
+        </p:spPr>
+        <p:txBody>
+          <a:bodyPr>
+            <a:noAutofit/>
+          </a:bodyPr>
+          <a:lstStyle/>
+          <a:p>
+            <a:pPr marL="0" indent="0" algn="just">
+              <a:buNone/>
+            </a:pPr>
+            <a:r>
+              <a:rPr lang="pt-BR" sz="2000" b="1" dirty="0">
+                <a:solidFill>
+                  <a:srgbClr val="FF0000"/>
+                </a:solidFill>
+                <a:latin typeface="Times New Roman" panose="02020603050405020304" pitchFamily="18" charset="0"/>
+                <a:cs typeface="Times New Roman" panose="02020603050405020304" pitchFamily="18" charset="0"/>
+              </a:rPr>
+              <a:t>Componentes</a:t>
+            </a:r>
+            <a:r>
+              <a:rPr lang="pt-BR" sz="2000" dirty="0">
+                <a:solidFill>
+                  <a:schemeClr val="tx1"/>
+                </a:solidFill>
+                <a:latin typeface="Times New Roman" panose="02020603050405020304" pitchFamily="18" charset="0"/>
+                <a:cs typeface="Times New Roman" panose="02020603050405020304" pitchFamily="18" charset="0"/>
+              </a:rPr>
+              <a:t>: </a:t>
+            </a:r>
+          </a:p>
+          <a:p>
+            <a:pPr marL="0" indent="0" algn="just">
+              <a:buNone/>
+            </a:pPr>
+            <a:endParaRPr lang="pt-BR" sz="2000" dirty="0">
+              <a:solidFill>
+                <a:schemeClr val="tx1"/>
+              </a:solidFill>
+              <a:latin typeface="Times New Roman" panose="02020603050405020304" pitchFamily="18" charset="0"/>
+              <a:cs typeface="Times New Roman" panose="02020603050405020304" pitchFamily="18" charset="0"/>
+            </a:endParaRPr>
+          </a:p>
+          <a:p>
+            <a:pPr algn="just">
+              <a:buFont typeface="Wingdings" panose="05000000000000000000" pitchFamily="2" charset="2"/>
+              <a:buChar char="§"/>
+            </a:pPr>
+            <a:r>
+              <a:rPr lang="pt-BR" sz="2000" dirty="0">
+                <a:solidFill>
+                  <a:schemeClr val="tx1"/>
+                </a:solidFill>
+                <a:latin typeface="Times New Roman" panose="02020603050405020304" pitchFamily="18" charset="0"/>
+                <a:cs typeface="Times New Roman" panose="02020603050405020304" pitchFamily="18" charset="0"/>
+              </a:rPr>
+              <a:t>LEDs</a:t>
+            </a:r>
+          </a:p>
+          <a:p>
+            <a:pPr algn="just">
+              <a:buFont typeface="Wingdings" panose="05000000000000000000" pitchFamily="2" charset="2"/>
+              <a:buChar char="§"/>
+            </a:pPr>
+            <a:r>
+              <a:rPr lang="pt-BR" sz="2000" dirty="0">
+                <a:solidFill>
+                  <a:schemeClr val="tx1"/>
+                </a:solidFill>
+                <a:latin typeface="Times New Roman" panose="02020603050405020304" pitchFamily="18" charset="0"/>
+                <a:cs typeface="Times New Roman" panose="02020603050405020304" pitchFamily="18" charset="0"/>
+              </a:rPr>
+              <a:t>Botões, como o </a:t>
+            </a:r>
+            <a:r>
+              <a:rPr lang="pt-BR" sz="2000" b="1" dirty="0">
+                <a:solidFill>
+                  <a:schemeClr val="tx1"/>
+                </a:solidFill>
+                <a:latin typeface="Times New Roman" panose="02020603050405020304" pitchFamily="18" charset="0"/>
+                <a:cs typeface="Times New Roman" panose="02020603050405020304" pitchFamily="18" charset="0"/>
+              </a:rPr>
+              <a:t>ethernet </a:t>
+            </a:r>
+            <a:r>
+              <a:rPr lang="pt-BR" sz="2000" b="1" dirty="0" err="1">
+                <a:solidFill>
+                  <a:schemeClr val="tx1"/>
+                </a:solidFill>
+                <a:latin typeface="Times New Roman" panose="02020603050405020304" pitchFamily="18" charset="0"/>
+                <a:cs typeface="Times New Roman" panose="02020603050405020304" pitchFamily="18" charset="0"/>
+              </a:rPr>
+              <a:t>shield</a:t>
+            </a:r>
+            <a:r>
+              <a:rPr lang="pt-BR" sz="2000" b="1" dirty="0">
+                <a:solidFill>
+                  <a:schemeClr val="tx1"/>
+                </a:solidFill>
+                <a:latin typeface="Times New Roman" panose="02020603050405020304" pitchFamily="18" charset="0"/>
+                <a:cs typeface="Times New Roman" panose="02020603050405020304" pitchFamily="18" charset="0"/>
+              </a:rPr>
+              <a:t> w5500</a:t>
+            </a:r>
+            <a:r>
+              <a:rPr lang="pt-BR" sz="2000" dirty="0">
+                <a:solidFill>
+                  <a:schemeClr val="tx1"/>
+                </a:solidFill>
+                <a:latin typeface="Times New Roman" panose="02020603050405020304" pitchFamily="18" charset="0"/>
+                <a:cs typeface="Times New Roman" panose="02020603050405020304" pitchFamily="18" charset="0"/>
+              </a:rPr>
+              <a:t> para conexão com a internet </a:t>
+            </a:r>
+          </a:p>
+          <a:p>
+            <a:pPr algn="just">
+              <a:buFont typeface="Wingdings" panose="05000000000000000000" pitchFamily="2" charset="2"/>
+              <a:buChar char="§"/>
+            </a:pPr>
+            <a:r>
+              <a:rPr lang="pt-BR" sz="2000" dirty="0">
+                <a:solidFill>
+                  <a:schemeClr val="tx1"/>
+                </a:solidFill>
+                <a:latin typeface="Times New Roman" panose="02020603050405020304" pitchFamily="18" charset="0"/>
+                <a:cs typeface="Times New Roman" panose="02020603050405020304" pitchFamily="18" charset="0"/>
+              </a:rPr>
+              <a:t>Display gráfico colorido </a:t>
+            </a:r>
+            <a:r>
+              <a:rPr lang="pt-BR" sz="2000" b="1" dirty="0">
+                <a:solidFill>
+                  <a:schemeClr val="tx1"/>
+                </a:solidFill>
+                <a:latin typeface="Times New Roman" panose="02020603050405020304" pitchFamily="18" charset="0"/>
+                <a:cs typeface="Times New Roman" panose="02020603050405020304" pitchFamily="18" charset="0"/>
+              </a:rPr>
+              <a:t>ili9340</a:t>
+            </a:r>
+            <a:r>
+              <a:rPr lang="pt-BR" sz="2000" dirty="0">
+                <a:solidFill>
+                  <a:schemeClr val="tx1"/>
+                </a:solidFill>
+                <a:latin typeface="Times New Roman" panose="02020603050405020304" pitchFamily="18" charset="0"/>
+                <a:cs typeface="Times New Roman" panose="02020603050405020304" pitchFamily="18" charset="0"/>
+              </a:rPr>
+              <a:t> com tela sensível ao toque</a:t>
+            </a:r>
+          </a:p>
+          <a:p>
+            <a:pPr algn="just">
+              <a:buFont typeface="Wingdings" panose="05000000000000000000" pitchFamily="2" charset="2"/>
+              <a:buChar char="§"/>
+            </a:pPr>
+            <a:r>
+              <a:rPr lang="pt-BR" sz="2000" dirty="0">
+                <a:solidFill>
+                  <a:schemeClr val="tx1"/>
+                </a:solidFill>
+                <a:latin typeface="Times New Roman" panose="02020603050405020304" pitchFamily="18" charset="0"/>
+                <a:cs typeface="Times New Roman" panose="02020603050405020304" pitchFamily="18" charset="0"/>
+              </a:rPr>
+              <a:t>Sensores</a:t>
+            </a:r>
+          </a:p>
+          <a:p>
+            <a:pPr algn="just">
+              <a:buFont typeface="Wingdings" panose="05000000000000000000" pitchFamily="2" charset="2"/>
+              <a:buChar char="§"/>
+            </a:pPr>
+            <a:r>
+              <a:rPr lang="pt-BR" sz="2000" dirty="0">
+                <a:solidFill>
+                  <a:schemeClr val="tx1"/>
+                </a:solidFill>
+                <a:latin typeface="Times New Roman" panose="02020603050405020304" pitchFamily="18" charset="0"/>
+                <a:cs typeface="Times New Roman" panose="02020603050405020304" pitchFamily="18" charset="0"/>
+              </a:rPr>
+              <a:t>Resistores, </a:t>
+            </a:r>
+            <a:r>
+              <a:rPr lang="pt-BR" sz="2000" dirty="0" err="1">
+                <a:solidFill>
+                  <a:schemeClr val="tx1"/>
+                </a:solidFill>
+                <a:latin typeface="Times New Roman" panose="02020603050405020304" pitchFamily="18" charset="0"/>
+                <a:cs typeface="Times New Roman" panose="02020603050405020304" pitchFamily="18" charset="0"/>
+              </a:rPr>
+              <a:t>etc</a:t>
+            </a:r>
+            <a:endParaRPr lang="pt-BR" sz="2000" dirty="0">
+              <a:solidFill>
+                <a:schemeClr val="tx1"/>
+              </a:solidFill>
+              <a:latin typeface="Times New Roman" panose="02020603050405020304" pitchFamily="18" charset="0"/>
+              <a:cs typeface="Times New Roman" panose="02020603050405020304" pitchFamily="18" charset="0"/>
+            </a:endParaRPr>
+          </a:p>
+          <a:p>
+            <a:pPr marL="0" indent="0" algn="just">
+              <a:buNone/>
+            </a:pPr>
+            <a:endParaRPr lang="pt-BR" sz="2000" dirty="0">
+              <a:solidFill>
+                <a:schemeClr val="tx1"/>
+              </a:solidFill>
+              <a:latin typeface="Times New Roman" panose="02020603050405020304" pitchFamily="18" charset="0"/>
+              <a:cs typeface="Times New Roman" panose="02020603050405020304" pitchFamily="18" charset="0"/>
+            </a:endParaRPr>
+          </a:p>
+          <a:p>
+            <a:pPr marL="0" indent="0" algn="just">
+              <a:buNone/>
+            </a:pPr>
+            <a:r>
+              <a:rPr lang="pt-BR" sz="2000" b="1" dirty="0">
+                <a:solidFill>
+                  <a:srgbClr val="FF0000"/>
+                </a:solidFill>
+                <a:latin typeface="Times New Roman" panose="02020603050405020304" pitchFamily="18" charset="0"/>
+                <a:cs typeface="Times New Roman" panose="02020603050405020304" pitchFamily="18" charset="0"/>
+              </a:rPr>
+              <a:t>Documentação</a:t>
+            </a:r>
+            <a:r>
+              <a:rPr lang="pt-BR" sz="2000" dirty="0">
+                <a:solidFill>
+                  <a:schemeClr val="tx1"/>
+                </a:solidFill>
+                <a:latin typeface="Times New Roman" panose="02020603050405020304" pitchFamily="18" charset="0"/>
+                <a:cs typeface="Times New Roman" panose="02020603050405020304" pitchFamily="18" charset="0"/>
+              </a:rPr>
+              <a:t>:</a:t>
+            </a:r>
+          </a:p>
+          <a:p>
+            <a:pPr marL="0" indent="0" algn="just">
+              <a:buNone/>
+            </a:pPr>
+            <a:r>
+              <a:rPr lang="pt-BR" sz="2000" dirty="0">
+                <a:solidFill>
+                  <a:schemeClr val="tx1"/>
+                </a:solidFill>
+                <a:latin typeface="Times New Roman" panose="02020603050405020304" pitchFamily="18" charset="0"/>
+                <a:cs typeface="Times New Roman" panose="02020603050405020304" pitchFamily="18" charset="0"/>
+              </a:rPr>
+              <a:t> 	</a:t>
+            </a:r>
+            <a:r>
+              <a:rPr lang="pt-BR" sz="2000" dirty="0">
+                <a:solidFill>
+                  <a:schemeClr val="tx1"/>
+                </a:solidFill>
+                <a:latin typeface="Times New Roman" panose="02020603050405020304" pitchFamily="18" charset="0"/>
+                <a:cs typeface="Times New Roman" panose="02020603050405020304" pitchFamily="18" charset="0"/>
+                <a:hlinkClick r:id="rId3"/>
+              </a:rPr>
+              <a:t>https://lcgamboa.github.io/picsimlab_docs/0.8.10/index.html</a:t>
+            </a:r>
+            <a:endParaRPr lang="pt-BR" sz="2000" dirty="0">
+              <a:solidFill>
+                <a:schemeClr val="tx1"/>
+              </a:solidFill>
+              <a:latin typeface="Times New Roman" panose="02020603050405020304" pitchFamily="18" charset="0"/>
+              <a:cs typeface="Times New Roman" panose="02020603050405020304" pitchFamily="18" charset="0"/>
+            </a:endParaRPr>
+          </a:p>
+        </p:txBody>
+      </p:sp>
+    </p:spTree>
+    <p:extLst>
+      <p:ext uri="{BB962C8B-B14F-4D97-AF65-F5344CB8AC3E}">
+        <p14:creationId xmlns:p14="http://schemas.microsoft.com/office/powerpoint/2010/main" val="328985191"/>
+      </p:ext>
+    </p:extLst>
+  </p:cSld>
+  <p:clrMapOvr>
+    <a:masterClrMapping/>
+  </p:clrMapOvr>
+  <p:transition spd="med"/>
+</p:sld>
+</file>
+
+<file path=ppt/slides/slide34.xml><?xml version="1.0" encoding="utf-8"?>
+<p:sld xmlns:a="http://schemas.openxmlformats.org/drawingml/2006/main" xmlns:r="http://schemas.openxmlformats.org/officeDocument/2006/relationships" xmlns:p="http://schemas.openxmlformats.org/presentationml/2006/main">
+  <p:cSld>
+    <p:spTree>
+      <p:nvGrpSpPr>
+        <p:cNvPr id="1" name=""/>
+        <p:cNvGrpSpPr/>
+        <p:nvPr/>
+      </p:nvGrpSpPr>
+      <p:grpSpPr>
+        <a:xfrm>
+          <a:off x="0" y="0"/>
+          <a:ext cx="0" cy="0"/>
+          <a:chOff x="0" y="0"/>
+          <a:chExt cx="0" cy="0"/>
+        </a:xfrm>
+      </p:grpSpPr>
+      <p:sp>
+        <p:nvSpPr>
+          <p:cNvPr id="6" name="Title 1"/>
+          <p:cNvSpPr>
+            <a:spLocks noGrp="1"/>
+          </p:cNvSpPr>
+          <p:nvPr>
+            <p:ph type="title"/>
+          </p:nvPr>
+        </p:nvSpPr>
+        <p:spPr>
+          <a:xfrm>
+            <a:off x="457200" y="205980"/>
+            <a:ext cx="8229600" cy="857251"/>
+          </a:xfrm>
+        </p:spPr>
+        <p:txBody>
+          <a:bodyPr>
+            <a:normAutofit fontScale="90000"/>
+          </a:bodyPr>
+          <a:lstStyle/>
+          <a:p>
+            <a:r>
+              <a:rPr lang="en-US" b="1" dirty="0" err="1">
+                <a:solidFill>
+                  <a:srgbClr val="0070C0"/>
+                </a:solidFill>
+              </a:rPr>
+              <a:t>Características</a:t>
+            </a:r>
+            <a:r>
+              <a:rPr lang="en-US" b="1" dirty="0">
+                <a:solidFill>
+                  <a:srgbClr val="0070C0"/>
+                </a:solidFill>
+              </a:rPr>
+              <a:t> da Ferramenta de </a:t>
+            </a:r>
+            <a:r>
+              <a:rPr lang="en-US" b="1" dirty="0" err="1">
+                <a:solidFill>
+                  <a:srgbClr val="0070C0"/>
+                </a:solidFill>
+              </a:rPr>
+              <a:t>Simulação</a:t>
+            </a:r>
+            <a:r>
+              <a:rPr lang="en-US" b="1" dirty="0">
+                <a:solidFill>
+                  <a:srgbClr val="0070C0"/>
+                </a:solidFill>
+              </a:rPr>
+              <a:t> </a:t>
+            </a:r>
+            <a:r>
+              <a:rPr lang="en-US" b="1" dirty="0" err="1">
+                <a:solidFill>
+                  <a:srgbClr val="0070C0"/>
+                </a:solidFill>
+              </a:rPr>
+              <a:t>PICSimLab</a:t>
+            </a:r>
+            <a:r>
+              <a:rPr lang="en-US" b="1" dirty="0">
+                <a:solidFill>
+                  <a:srgbClr val="0070C0"/>
+                </a:solidFill>
+              </a:rPr>
+              <a:t> CI PIC</a:t>
+            </a:r>
+          </a:p>
+        </p:txBody>
+      </p:sp>
+      <p:sp>
+        <p:nvSpPr>
+          <p:cNvPr id="8" name="Text Placeholder 2"/>
+          <p:cNvSpPr>
+            <a:spLocks noGrp="1"/>
+          </p:cNvSpPr>
+          <p:nvPr>
+            <p:ph type="body" sz="half" idx="1"/>
+          </p:nvPr>
+        </p:nvSpPr>
+        <p:spPr>
+          <a:xfrm>
+            <a:off x="142865" y="1200150"/>
+            <a:ext cx="8865056" cy="3835146"/>
+          </a:xfrm>
+        </p:spPr>
+        <p:txBody>
+          <a:bodyPr>
+            <a:noAutofit/>
+          </a:bodyPr>
+          <a:lstStyle/>
+          <a:p>
+            <a:pPr marL="0" indent="0" algn="just">
+              <a:buNone/>
+            </a:pPr>
+            <a:endParaRPr lang="pt-BR" sz="2000" dirty="0">
+              <a:solidFill>
+                <a:schemeClr val="tx1"/>
+              </a:solidFill>
+              <a:latin typeface="Times New Roman" panose="02020603050405020304" pitchFamily="18" charset="0"/>
+              <a:cs typeface="Times New Roman" panose="02020603050405020304" pitchFamily="18" charset="0"/>
+            </a:endParaRPr>
+          </a:p>
+        </p:txBody>
+      </p:sp>
+      <p:pic>
+        <p:nvPicPr>
+          <p:cNvPr id="3" name="Imagem 2">
+            <a:extLst>
+              <a:ext uri="{FF2B5EF4-FFF2-40B4-BE49-F238E27FC236}">
+                <a16:creationId xmlns:a16="http://schemas.microsoft.com/office/drawing/2014/main" id="{18D43F34-6BB7-AE5D-413E-3546A9304581}"/>
+              </a:ext>
+            </a:extLst>
+          </p:cNvPr>
+          <p:cNvPicPr>
+            <a:picLocks noChangeAspect="1"/>
+          </p:cNvPicPr>
+          <p:nvPr/>
+        </p:nvPicPr>
+        <p:blipFill>
+          <a:blip r:embed="rId3"/>
+          <a:stretch>
+            <a:fillRect/>
+          </a:stretch>
+        </p:blipFill>
+        <p:spPr>
+          <a:xfrm>
+            <a:off x="733426" y="1226945"/>
+            <a:ext cx="5976468" cy="3759391"/>
+          </a:xfrm>
+          <a:prstGeom prst="rect">
+            <a:avLst/>
+          </a:prstGeom>
+        </p:spPr>
+      </p:pic>
+    </p:spTree>
+    <p:extLst>
+      <p:ext uri="{BB962C8B-B14F-4D97-AF65-F5344CB8AC3E}">
+        <p14:creationId xmlns:p14="http://schemas.microsoft.com/office/powerpoint/2010/main" val="293987136"/>
+      </p:ext>
+    </p:extLst>
+  </p:cSld>
+  <p:clrMapOvr>
+    <a:masterClrMapping/>
+  </p:clrMapOvr>
+  <p:transition spd="med"/>
+</p:sld>
+</file>
+
+<file path=ppt/slides/slide35.xml><?xml version="1.0" encoding="utf-8"?>
+<p:sld xmlns:a="http://schemas.openxmlformats.org/drawingml/2006/main" xmlns:r="http://schemas.openxmlformats.org/officeDocument/2006/relationships" xmlns:p="http://schemas.openxmlformats.org/presentationml/2006/main">
+  <p:cSld>
+    <p:spTree>
+      <p:nvGrpSpPr>
+        <p:cNvPr id="1" name=""/>
+        <p:cNvGrpSpPr/>
+        <p:nvPr/>
+      </p:nvGrpSpPr>
+      <p:grpSpPr>
+        <a:xfrm>
+          <a:off x="0" y="0"/>
+          <a:ext cx="0" cy="0"/>
+          <a:chOff x="0" y="0"/>
+          <a:chExt cx="0" cy="0"/>
+        </a:xfrm>
+      </p:grpSpPr>
+      <p:sp>
+        <p:nvSpPr>
+          <p:cNvPr id="6" name="Title 1"/>
+          <p:cNvSpPr>
+            <a:spLocks noGrp="1"/>
+          </p:cNvSpPr>
+          <p:nvPr>
+            <p:ph type="title"/>
+          </p:nvPr>
+        </p:nvSpPr>
+        <p:spPr>
+          <a:xfrm>
+            <a:off x="457200" y="205980"/>
+            <a:ext cx="8229600" cy="857251"/>
+          </a:xfrm>
+        </p:spPr>
+        <p:txBody>
+          <a:bodyPr>
             <a:normAutofit/>
           </a:bodyPr>
           <a:lstStyle/>
@@ -13874,7 +15180,7 @@
                   <a:srgbClr val="0070C0"/>
                 </a:solidFill>
               </a:rPr>
-              <a:t>Referências</a:t>
+              <a:t>Leitura</a:t>
             </a:r>
             <a:r>
               <a:rPr lang="en-US" b="1" dirty="0">
@@ -13890,7 +15196,7 @@
                   <a:srgbClr val="0070C0"/>
                 </a:solidFill>
               </a:rPr>
-              <a:t>Bibliográficas</a:t>
+              <a:t>Específica</a:t>
             </a:r>
             <a:endParaRPr lang="en-US" b="1" dirty="0">
               <a:solidFill>
@@ -13926,6 +15232,599 @@
               <a:buNone/>
             </a:pPr>
             <a:r>
+              <a:rPr lang="pt-BR" sz="2000" dirty="0">
+                <a:latin typeface="Times New Roman" panose="02020603050405020304" pitchFamily="18" charset="0"/>
+                <a:cs typeface="Times New Roman" panose="02020603050405020304" pitchFamily="18" charset="0"/>
+              </a:rPr>
+              <a:t>[1] Sistemas Embarcados.</a:t>
+            </a:r>
+          </a:p>
+          <a:p>
+            <a:pPr marL="0" indent="0" algn="just">
+              <a:buNone/>
+            </a:pPr>
+            <a:r>
+              <a:rPr lang="pt-BR" sz="2000" b="1" dirty="0">
+                <a:solidFill>
+                  <a:srgbClr val="FF0000"/>
+                </a:solidFill>
+                <a:latin typeface="Times New Roman" panose="02020603050405020304" pitchFamily="18" charset="0"/>
+                <a:cs typeface="Times New Roman" panose="02020603050405020304" pitchFamily="18" charset="0"/>
+              </a:rPr>
+              <a:t>Disponível em: </a:t>
+            </a:r>
+            <a:r>
+              <a:rPr lang="pt-BR" sz="2000" dirty="0">
+                <a:latin typeface="Times New Roman" panose="02020603050405020304" pitchFamily="18" charset="0"/>
+                <a:cs typeface="Times New Roman" panose="02020603050405020304" pitchFamily="18" charset="0"/>
+                <a:hlinkClick r:id="rId3"/>
+              </a:rPr>
+              <a:t>https://files.comunidades.net/mutcom/ARTIGO_SIST_EMB.pdf</a:t>
+            </a:r>
+            <a:endParaRPr lang="pt-BR" sz="2000" dirty="0">
+              <a:latin typeface="Times New Roman" panose="02020603050405020304" pitchFamily="18" charset="0"/>
+              <a:cs typeface="Times New Roman" panose="02020603050405020304" pitchFamily="18" charset="0"/>
+            </a:endParaRPr>
+          </a:p>
+          <a:p>
+            <a:pPr marL="0" indent="0" algn="just">
+              <a:buNone/>
+            </a:pPr>
+            <a:endParaRPr lang="pt-BR" sz="2000" dirty="0">
+              <a:latin typeface="Times New Roman" panose="02020603050405020304" pitchFamily="18" charset="0"/>
+              <a:cs typeface="Times New Roman" panose="02020603050405020304" pitchFamily="18" charset="0"/>
+            </a:endParaRPr>
+          </a:p>
+          <a:p>
+            <a:pPr marL="0" indent="0" algn="just">
+              <a:buNone/>
+            </a:pPr>
+            <a:endParaRPr lang="pt-BR" sz="2000" dirty="0">
+              <a:latin typeface="Times New Roman" panose="02020603050405020304" pitchFamily="18" charset="0"/>
+              <a:cs typeface="Times New Roman" panose="02020603050405020304" pitchFamily="18" charset="0"/>
+            </a:endParaRPr>
+          </a:p>
+          <a:p>
+            <a:pPr marL="0" indent="0" algn="just">
+              <a:buNone/>
+            </a:pPr>
+            <a:r>
+              <a:rPr lang="pt-BR" sz="2000" dirty="0">
+                <a:latin typeface="Times New Roman" panose="02020603050405020304" pitchFamily="18" charset="0"/>
+                <a:cs typeface="Times New Roman" panose="02020603050405020304" pitchFamily="18" charset="0"/>
+              </a:rPr>
+              <a:t>[2] </a:t>
+            </a:r>
+            <a:r>
+              <a:rPr lang="pt-BR" sz="2000" dirty="0" err="1">
+                <a:latin typeface="Times New Roman" panose="02020603050405020304" pitchFamily="18" charset="0"/>
+                <a:cs typeface="Times New Roman" panose="02020603050405020304" pitchFamily="18" charset="0"/>
+              </a:rPr>
+              <a:t>Elicitação</a:t>
+            </a:r>
+            <a:r>
+              <a:rPr lang="pt-BR" sz="2000" dirty="0">
+                <a:latin typeface="Times New Roman" panose="02020603050405020304" pitchFamily="18" charset="0"/>
+                <a:cs typeface="Times New Roman" panose="02020603050405020304" pitchFamily="18" charset="0"/>
+              </a:rPr>
+              <a:t> e Especificação de Requisitos Sistemas Embarcados. </a:t>
+            </a:r>
+          </a:p>
+          <a:p>
+            <a:pPr marL="0" indent="0" algn="just">
+              <a:buNone/>
+            </a:pPr>
+            <a:r>
+              <a:rPr lang="pt-BR" sz="2000" b="1" dirty="0">
+                <a:solidFill>
+                  <a:srgbClr val="FF0000"/>
+                </a:solidFill>
+                <a:latin typeface="Times New Roman" panose="02020603050405020304" pitchFamily="18" charset="0"/>
+                <a:cs typeface="Times New Roman" panose="02020603050405020304" pitchFamily="18" charset="0"/>
+              </a:rPr>
+              <a:t>Disponível em: </a:t>
+            </a:r>
+            <a:r>
+              <a:rPr lang="pt-BR" sz="2000" dirty="0">
+                <a:latin typeface="Times New Roman" panose="02020603050405020304" pitchFamily="18" charset="0"/>
+                <a:cs typeface="Times New Roman" panose="02020603050405020304" pitchFamily="18" charset="0"/>
+                <a:hlinkClick r:id="rId4"/>
+              </a:rPr>
+              <a:t>https://eventos.spc.org.pe/cibse2015/pdfs/07_WER15.pdf</a:t>
+            </a:r>
+            <a:endParaRPr lang="pt-BR" sz="2000" dirty="0">
+              <a:latin typeface="Times New Roman" panose="02020603050405020304" pitchFamily="18" charset="0"/>
+              <a:cs typeface="Times New Roman" panose="02020603050405020304" pitchFamily="18" charset="0"/>
+            </a:endParaRPr>
+          </a:p>
+        </p:txBody>
+      </p:sp>
+    </p:spTree>
+    <p:extLst>
+      <p:ext uri="{BB962C8B-B14F-4D97-AF65-F5344CB8AC3E}">
+        <p14:creationId xmlns:p14="http://schemas.microsoft.com/office/powerpoint/2010/main" val="3680270425"/>
+      </p:ext>
+    </p:extLst>
+  </p:cSld>
+  <p:clrMapOvr>
+    <a:masterClrMapping/>
+  </p:clrMapOvr>
+  <p:transition spd="med"/>
+</p:sld>
+</file>
+
+<file path=ppt/slides/slide36.xml><?xml version="1.0" encoding="utf-8"?>
+<p:sld xmlns:a="http://schemas.openxmlformats.org/drawingml/2006/main" xmlns:r="http://schemas.openxmlformats.org/officeDocument/2006/relationships" xmlns:p="http://schemas.openxmlformats.org/presentationml/2006/main">
+  <p:cSld>
+    <p:spTree>
+      <p:nvGrpSpPr>
+        <p:cNvPr id="1" name=""/>
+        <p:cNvGrpSpPr/>
+        <p:nvPr/>
+      </p:nvGrpSpPr>
+      <p:grpSpPr>
+        <a:xfrm>
+          <a:off x="0" y="0"/>
+          <a:ext cx="0" cy="0"/>
+          <a:chOff x="0" y="0"/>
+          <a:chExt cx="0" cy="0"/>
+        </a:xfrm>
+      </p:grpSpPr>
+      <p:sp>
+        <p:nvSpPr>
+          <p:cNvPr id="6" name="Title 1"/>
+          <p:cNvSpPr>
+            <a:spLocks noGrp="1"/>
+          </p:cNvSpPr>
+          <p:nvPr>
+            <p:ph type="title"/>
+          </p:nvPr>
+        </p:nvSpPr>
+        <p:spPr>
+          <a:xfrm>
+            <a:off x="457200" y="205980"/>
+            <a:ext cx="8229600" cy="857251"/>
+          </a:xfrm>
+        </p:spPr>
+        <p:txBody>
+          <a:bodyPr>
+            <a:normAutofit/>
+          </a:bodyPr>
+          <a:lstStyle/>
+          <a:p>
+            <a:r>
+              <a:rPr lang="en-US" b="1" dirty="0" err="1">
+                <a:solidFill>
+                  <a:srgbClr val="0070C0"/>
+                </a:solidFill>
+              </a:rPr>
+              <a:t>Aprenda</a:t>
+            </a:r>
+            <a:r>
+              <a:rPr lang="en-US" b="1" dirty="0">
+                <a:solidFill>
+                  <a:srgbClr val="0070C0"/>
+                </a:solidFill>
+              </a:rPr>
+              <a:t>+</a:t>
+            </a:r>
+          </a:p>
+        </p:txBody>
+      </p:sp>
+      <p:sp>
+        <p:nvSpPr>
+          <p:cNvPr id="8" name="Text Placeholder 2"/>
+          <p:cNvSpPr>
+            <a:spLocks noGrp="1"/>
+          </p:cNvSpPr>
+          <p:nvPr>
+            <p:ph type="body" sz="half" idx="1"/>
+          </p:nvPr>
+        </p:nvSpPr>
+        <p:spPr>
+          <a:xfrm>
+            <a:off x="142865" y="1200150"/>
+            <a:ext cx="8865056" cy="3737370"/>
+          </a:xfrm>
+        </p:spPr>
+        <p:txBody>
+          <a:bodyPr>
+            <a:noAutofit/>
+          </a:bodyPr>
+          <a:lstStyle/>
+          <a:p>
+            <a:pPr marL="0" indent="0" algn="just">
+              <a:buNone/>
+            </a:pPr>
+            <a:r>
+              <a:rPr lang="pt-BR" sz="2400" dirty="0">
+                <a:latin typeface="Times New Roman" panose="02020603050405020304" pitchFamily="18" charset="0"/>
+                <a:cs typeface="Times New Roman" panose="02020603050405020304" pitchFamily="18" charset="0"/>
+              </a:rPr>
+              <a:t>[1] Cursos Sistemas Embarcados - Microcontroladores</a:t>
+            </a:r>
+          </a:p>
+          <a:p>
+            <a:pPr marL="0" indent="0" algn="just">
+              <a:buNone/>
+            </a:pPr>
+            <a:r>
+              <a:rPr lang="pt-BR" sz="2400" b="1" dirty="0">
+                <a:solidFill>
+                  <a:srgbClr val="FF0000"/>
+                </a:solidFill>
+                <a:latin typeface="Times New Roman" panose="02020603050405020304" pitchFamily="18" charset="0"/>
+                <a:cs typeface="Times New Roman" panose="02020603050405020304" pitchFamily="18" charset="0"/>
+              </a:rPr>
+              <a:t>Disponível em: </a:t>
+            </a:r>
+            <a:r>
+              <a:rPr lang="pt-BR" sz="2400" dirty="0">
+                <a:latin typeface="Times New Roman" panose="02020603050405020304" pitchFamily="18" charset="0"/>
+                <a:cs typeface="Times New Roman" panose="02020603050405020304" pitchFamily="18" charset="0"/>
+                <a:hlinkClick r:id="rId3"/>
+              </a:rPr>
+              <a:t>https://embarcados.com.br/cursos/</a:t>
+            </a:r>
+            <a:endParaRPr lang="pt-BR" sz="2400" dirty="0">
+              <a:latin typeface="Times New Roman" panose="02020603050405020304" pitchFamily="18" charset="0"/>
+              <a:cs typeface="Times New Roman" panose="02020603050405020304" pitchFamily="18" charset="0"/>
+            </a:endParaRPr>
+          </a:p>
+          <a:p>
+            <a:pPr marL="0" indent="0" algn="just">
+              <a:buNone/>
+            </a:pPr>
+            <a:endParaRPr lang="pt-BR" sz="2400" dirty="0">
+              <a:latin typeface="Times New Roman" panose="02020603050405020304" pitchFamily="18" charset="0"/>
+              <a:cs typeface="Times New Roman" panose="02020603050405020304" pitchFamily="18" charset="0"/>
+            </a:endParaRPr>
+          </a:p>
+          <a:p>
+            <a:pPr marL="0" indent="0" algn="just">
+              <a:buNone/>
+            </a:pPr>
+            <a:endParaRPr lang="pt-BR" sz="2400" dirty="0">
+              <a:latin typeface="Times New Roman" panose="02020603050405020304" pitchFamily="18" charset="0"/>
+              <a:cs typeface="Times New Roman" panose="02020603050405020304" pitchFamily="18" charset="0"/>
+            </a:endParaRPr>
+          </a:p>
+          <a:p>
+            <a:pPr marL="0" indent="0" algn="just">
+              <a:buNone/>
+            </a:pPr>
+            <a:r>
+              <a:rPr lang="pt-BR" sz="2400" dirty="0">
+                <a:latin typeface="Times New Roman" panose="02020603050405020304" pitchFamily="18" charset="0"/>
+                <a:cs typeface="Times New Roman" panose="02020603050405020304" pitchFamily="18" charset="0"/>
+              </a:rPr>
+              <a:t>[2] Arquitetura de Software para Sistemas Embarcados</a:t>
+            </a:r>
+          </a:p>
+          <a:p>
+            <a:pPr marL="0" indent="0" algn="just">
+              <a:buNone/>
+            </a:pPr>
+            <a:r>
+              <a:rPr lang="pt-BR" sz="2400" b="1" dirty="0">
+                <a:solidFill>
+                  <a:srgbClr val="FF0000"/>
+                </a:solidFill>
+                <a:latin typeface="Times New Roman" panose="02020603050405020304" pitchFamily="18" charset="0"/>
+                <a:cs typeface="Times New Roman" panose="02020603050405020304" pitchFamily="18" charset="0"/>
+              </a:rPr>
+              <a:t>Disponível em: </a:t>
+            </a:r>
+            <a:r>
+              <a:rPr lang="pt-BR" sz="2400" dirty="0">
+                <a:latin typeface="Times New Roman" panose="02020603050405020304" pitchFamily="18" charset="0"/>
+                <a:cs typeface="Times New Roman" panose="02020603050405020304" pitchFamily="18" charset="0"/>
+                <a:hlinkClick r:id="rId4"/>
+              </a:rPr>
+              <a:t>https://www.youtube.com/watch?v=UIAOR32H1vk</a:t>
+            </a:r>
+            <a:endParaRPr lang="pt-BR" sz="2400" dirty="0">
+              <a:latin typeface="Times New Roman" panose="02020603050405020304" pitchFamily="18" charset="0"/>
+              <a:cs typeface="Times New Roman" panose="02020603050405020304" pitchFamily="18" charset="0"/>
+            </a:endParaRPr>
+          </a:p>
+        </p:txBody>
+      </p:sp>
+    </p:spTree>
+    <p:extLst>
+      <p:ext uri="{BB962C8B-B14F-4D97-AF65-F5344CB8AC3E}">
+        <p14:creationId xmlns:p14="http://schemas.microsoft.com/office/powerpoint/2010/main" val="2747596967"/>
+      </p:ext>
+    </p:extLst>
+  </p:cSld>
+  <p:clrMapOvr>
+    <a:masterClrMapping/>
+  </p:clrMapOvr>
+  <p:transition spd="med"/>
+</p:sld>
+</file>
+
+<file path=ppt/slides/slide37.xml><?xml version="1.0" encoding="utf-8"?>
+<p:sld xmlns:a="http://schemas.openxmlformats.org/drawingml/2006/main" xmlns:r="http://schemas.openxmlformats.org/officeDocument/2006/relationships" xmlns:p="http://schemas.openxmlformats.org/presentationml/2006/main">
+  <p:cSld>
+    <p:spTree>
+      <p:nvGrpSpPr>
+        <p:cNvPr id="1" name=""/>
+        <p:cNvGrpSpPr/>
+        <p:nvPr/>
+      </p:nvGrpSpPr>
+      <p:grpSpPr>
+        <a:xfrm>
+          <a:off x="0" y="0"/>
+          <a:ext cx="0" cy="0"/>
+          <a:chOff x="0" y="0"/>
+          <a:chExt cx="0" cy="0"/>
+        </a:xfrm>
+      </p:grpSpPr>
+      <p:sp>
+        <p:nvSpPr>
+          <p:cNvPr id="6" name="Title 1"/>
+          <p:cNvSpPr>
+            <a:spLocks noGrp="1"/>
+          </p:cNvSpPr>
+          <p:nvPr>
+            <p:ph type="title"/>
+          </p:nvPr>
+        </p:nvSpPr>
+        <p:spPr>
+          <a:xfrm>
+            <a:off x="457200" y="205980"/>
+            <a:ext cx="8229600" cy="857251"/>
+          </a:xfrm>
+        </p:spPr>
+        <p:txBody>
+          <a:bodyPr>
+            <a:normAutofit/>
+          </a:bodyPr>
+          <a:lstStyle/>
+          <a:p>
+            <a:r>
+              <a:rPr lang="en-US" b="1" dirty="0" err="1">
+                <a:solidFill>
+                  <a:srgbClr val="0070C0"/>
+                </a:solidFill>
+              </a:rPr>
+              <a:t>Dinâmica</a:t>
+            </a:r>
+            <a:r>
+              <a:rPr lang="en-US" b="1" dirty="0">
+                <a:solidFill>
+                  <a:srgbClr val="0070C0"/>
+                </a:solidFill>
+              </a:rPr>
+              <a:t>/</a:t>
+            </a:r>
+            <a:r>
+              <a:rPr lang="en-US" b="1" dirty="0" err="1">
+                <a:solidFill>
+                  <a:srgbClr val="0070C0"/>
+                </a:solidFill>
+              </a:rPr>
+              <a:t>Atividades</a:t>
+            </a:r>
+            <a:endParaRPr lang="en-US" b="1" dirty="0">
+              <a:solidFill>
+                <a:srgbClr val="0070C0"/>
+              </a:solidFill>
+            </a:endParaRPr>
+          </a:p>
+        </p:txBody>
+      </p:sp>
+      <p:sp>
+        <p:nvSpPr>
+          <p:cNvPr id="8" name="Text Placeholder 2"/>
+          <p:cNvSpPr>
+            <a:spLocks noGrp="1"/>
+          </p:cNvSpPr>
+          <p:nvPr>
+            <p:ph type="body" sz="half" idx="1"/>
+          </p:nvPr>
+        </p:nvSpPr>
+        <p:spPr>
+          <a:xfrm>
+            <a:off x="139472" y="1063230"/>
+            <a:ext cx="8865056" cy="3606305"/>
+          </a:xfrm>
+        </p:spPr>
+        <p:txBody>
+          <a:bodyPr>
+            <a:noAutofit/>
+          </a:bodyPr>
+          <a:lstStyle/>
+          <a:p>
+            <a:pPr marL="0" indent="0" algn="just">
+              <a:buNone/>
+            </a:pPr>
+            <a:r>
+              <a:rPr lang="pt-BR" dirty="0">
+                <a:latin typeface="Times New Roman" panose="02020603050405020304" pitchFamily="18" charset="0"/>
+                <a:cs typeface="Times New Roman" panose="02020603050405020304" pitchFamily="18" charset="0"/>
+              </a:rPr>
+              <a:t>Exercícios (Atividade Verificadora de Aprendizagem)</a:t>
+            </a:r>
+          </a:p>
+          <a:p>
+            <a:pPr marL="0" indent="0" algn="just">
+              <a:buNone/>
+            </a:pPr>
+            <a:r>
+              <a:rPr lang="pt-BR" sz="2000" dirty="0">
+                <a:latin typeface="Times New Roman" panose="02020603050405020304" pitchFamily="18" charset="0"/>
+                <a:cs typeface="Times New Roman" panose="02020603050405020304" pitchFamily="18" charset="0"/>
+              </a:rPr>
+              <a:t> 	</a:t>
+            </a:r>
+          </a:p>
+          <a:p>
+            <a:pPr marL="0" indent="0" algn="just">
+              <a:buNone/>
+            </a:pPr>
+            <a:r>
+              <a:rPr lang="pt-BR" sz="2000" dirty="0">
+                <a:latin typeface="Times New Roman" panose="02020603050405020304" pitchFamily="18" charset="0"/>
+                <a:cs typeface="Times New Roman" panose="02020603050405020304" pitchFamily="18" charset="0"/>
+                <a:hlinkClick r:id="rId3"/>
+              </a:rPr>
+              <a:t>https://quizizz.com/admin/quiz/5aa686b4bc8374001abc8e88/sistemas-embarcados-e-microcontroladores</a:t>
+            </a:r>
+            <a:endParaRPr lang="pt-BR" sz="2000" dirty="0">
+              <a:latin typeface="Times New Roman" panose="02020603050405020304" pitchFamily="18" charset="0"/>
+              <a:cs typeface="Times New Roman" panose="02020603050405020304" pitchFamily="18" charset="0"/>
+            </a:endParaRPr>
+          </a:p>
+          <a:p>
+            <a:pPr marL="0" indent="0" algn="just">
+              <a:buNone/>
+            </a:pPr>
+            <a:endParaRPr lang="pt-BR" sz="2000" dirty="0">
+              <a:latin typeface="Times New Roman" panose="02020603050405020304" pitchFamily="18" charset="0"/>
+              <a:cs typeface="Times New Roman" panose="02020603050405020304" pitchFamily="18" charset="0"/>
+            </a:endParaRPr>
+          </a:p>
+          <a:p>
+            <a:pPr marL="0" indent="0" algn="just">
+              <a:buNone/>
+            </a:pPr>
+            <a:r>
+              <a:rPr lang="pt-BR" sz="2000" dirty="0">
+                <a:latin typeface="Times New Roman" panose="02020603050405020304" pitchFamily="18" charset="0"/>
+                <a:cs typeface="Times New Roman" panose="02020603050405020304" pitchFamily="18" charset="0"/>
+                <a:hlinkClick r:id="rId4"/>
+              </a:rPr>
+              <a:t>https://quizizz.com/admin/quiz/5e8cb43dec5442001b4c12bd/revisao-de-compiladores-u1-e-u2</a:t>
+            </a:r>
+            <a:endParaRPr lang="pt-BR" sz="2000" dirty="0">
+              <a:latin typeface="Times New Roman" panose="02020603050405020304" pitchFamily="18" charset="0"/>
+              <a:cs typeface="Times New Roman" panose="02020603050405020304" pitchFamily="18" charset="0"/>
+            </a:endParaRPr>
+          </a:p>
+          <a:p>
+            <a:pPr marL="0" indent="0" algn="just">
+              <a:buNone/>
+            </a:pPr>
+            <a:endParaRPr lang="pt-BR" sz="2000" dirty="0">
+              <a:latin typeface="Times New Roman" panose="02020603050405020304" pitchFamily="18" charset="0"/>
+              <a:cs typeface="Times New Roman" panose="02020603050405020304" pitchFamily="18" charset="0"/>
+            </a:endParaRPr>
+          </a:p>
+        </p:txBody>
+      </p:sp>
+    </p:spTree>
+    <p:extLst>
+      <p:ext uri="{BB962C8B-B14F-4D97-AF65-F5344CB8AC3E}">
+        <p14:creationId xmlns:p14="http://schemas.microsoft.com/office/powerpoint/2010/main" val="2470652989"/>
+      </p:ext>
+    </p:extLst>
+  </p:cSld>
+  <p:clrMapOvr>
+    <a:masterClrMapping/>
+  </p:clrMapOvr>
+  <p:transition spd="med"/>
+</p:sld>
+</file>
+
+<file path=ppt/slides/slide38.xml><?xml version="1.0" encoding="utf-8"?>
+<p:sld xmlns:a="http://schemas.openxmlformats.org/drawingml/2006/main" xmlns:r="http://schemas.openxmlformats.org/officeDocument/2006/relationships" xmlns:p="http://schemas.openxmlformats.org/presentationml/2006/main">
+  <p:cSld>
+    <p:spTree>
+      <p:nvGrpSpPr>
+        <p:cNvPr id="1" name=""/>
+        <p:cNvGrpSpPr/>
+        <p:nvPr/>
+      </p:nvGrpSpPr>
+      <p:grpSpPr>
+        <a:xfrm>
+          <a:off x="0" y="0"/>
+          <a:ext cx="0" cy="0"/>
+          <a:chOff x="0" y="0"/>
+          <a:chExt cx="0" cy="0"/>
+        </a:xfrm>
+      </p:grpSpPr>
+      <p:sp>
+        <p:nvSpPr>
+          <p:cNvPr id="6" name="Title 1"/>
+          <p:cNvSpPr>
+            <a:spLocks noGrp="1"/>
+          </p:cNvSpPr>
+          <p:nvPr>
+            <p:ph type="title"/>
+          </p:nvPr>
+        </p:nvSpPr>
+        <p:spPr>
+          <a:xfrm>
+            <a:off x="457200" y="205980"/>
+            <a:ext cx="8229600" cy="857251"/>
+          </a:xfrm>
+        </p:spPr>
+        <p:txBody>
+          <a:bodyPr>
+            <a:normAutofit/>
+          </a:bodyPr>
+          <a:lstStyle/>
+          <a:p>
+            <a:r>
+              <a:rPr lang="en-US" b="1" dirty="0" err="1">
+                <a:solidFill>
+                  <a:srgbClr val="0070C0"/>
+                </a:solidFill>
+              </a:rPr>
+              <a:t>Referências</a:t>
+            </a:r>
+            <a:r>
+              <a:rPr lang="en-US" b="1" dirty="0">
+                <a:solidFill>
+                  <a:srgbClr val="0070C0"/>
+                </a:solidFill>
+              </a:rPr>
+              <a:t> </a:t>
+            </a:r>
+            <a:r>
+              <a:rPr lang="en-US" b="1" dirty="0" err="1">
+                <a:solidFill>
+                  <a:srgbClr val="0070C0"/>
+                </a:solidFill>
+              </a:rPr>
+              <a:t>Bibliográficas</a:t>
+            </a:r>
+            <a:endParaRPr lang="en-US" b="1" dirty="0">
+              <a:solidFill>
+                <a:srgbClr val="0070C0"/>
+              </a:solidFill>
+            </a:endParaRPr>
+          </a:p>
+        </p:txBody>
+      </p:sp>
+      <p:sp>
+        <p:nvSpPr>
+          <p:cNvPr id="8" name="Text Placeholder 2"/>
+          <p:cNvSpPr>
+            <a:spLocks noGrp="1"/>
+          </p:cNvSpPr>
+          <p:nvPr>
+            <p:ph type="body" sz="half" idx="1"/>
+          </p:nvPr>
+        </p:nvSpPr>
+        <p:spPr>
+          <a:xfrm>
+            <a:off x="142865" y="1200150"/>
+            <a:ext cx="8865056" cy="3737369"/>
+          </a:xfrm>
+        </p:spPr>
+        <p:txBody>
+          <a:bodyPr>
+            <a:noAutofit/>
+          </a:bodyPr>
+          <a:lstStyle/>
+          <a:p>
+            <a:pPr marL="0" indent="0" algn="just">
+              <a:buNone/>
+            </a:pPr>
+            <a:r>
               <a:rPr lang="pt-BR" sz="1800" dirty="0">
                 <a:latin typeface="Calibri" panose="020F0502020204030204" pitchFamily="34" charset="0"/>
               </a:rPr>
@@ -14145,7 +16044,7 @@
 </p:sld>
 </file>
 
-<file path=ppt/slides/slide34.xml><?xml version="1.0" encoding="utf-8"?>
+<file path=ppt/slides/slide39.xml><?xml version="1.0" encoding="utf-8"?>
 <p:sld xmlns:a="http://schemas.openxmlformats.org/drawingml/2006/main" xmlns:r="http://schemas.openxmlformats.org/officeDocument/2006/relationships" xmlns:p="http://schemas.openxmlformats.org/presentationml/2006/main">
   <p:cSld>
     <p:spTree>

</xml_diff>